<commit_message>
Update blog post "Core Algorithms Deployed in Linux Kernel".
</commit_message>
<xml_diff>
--- a/images/2015-12-06-1/Linux-Kernel-Core-Algorithms.pptx
+++ b/images/2015-12-06-1/Linux-Kernel-Core-Algorithms.pptx
@@ -8,6 +8,8 @@
     <p:sldId id="256" r:id="rId2"/>
     <p:sldId id="257" r:id="rId3"/>
     <p:sldId id="258" r:id="rId4"/>
+    <p:sldId id="261" r:id="rId5"/>
+    <p:sldId id="260" r:id="rId6"/>
   </p:sldIdLst>
   <p:sldSz cx="9144000" cy="6858000" type="screen4x3"/>
   <p:notesSz cx="6858000" cy="9144000"/>
@@ -290,7 +292,7 @@
           <a:p>
             <a:fld id="{AD627E06-CAEC-4B89-B66F-9B64A1A0378A}" type="datetimeFigureOut">
               <a:rPr lang="en-US" smtClean="0"/>
-              <a:t>12/6/2015</a:t>
+              <a:t>12/7/2015</a:t>
             </a:fld>
             <a:endParaRPr lang="en-US"/>
           </a:p>
@@ -460,7 +462,7 @@
           <a:p>
             <a:fld id="{AD627E06-CAEC-4B89-B66F-9B64A1A0378A}" type="datetimeFigureOut">
               <a:rPr lang="en-US" smtClean="0"/>
-              <a:t>12/6/2015</a:t>
+              <a:t>12/7/2015</a:t>
             </a:fld>
             <a:endParaRPr lang="en-US"/>
           </a:p>
@@ -640,7 +642,7 @@
           <a:p>
             <a:fld id="{AD627E06-CAEC-4B89-B66F-9B64A1A0378A}" type="datetimeFigureOut">
               <a:rPr lang="en-US" smtClean="0"/>
-              <a:t>12/6/2015</a:t>
+              <a:t>12/7/2015</a:t>
             </a:fld>
             <a:endParaRPr lang="en-US"/>
           </a:p>
@@ -810,7 +812,7 @@
           <a:p>
             <a:fld id="{AD627E06-CAEC-4B89-B66F-9B64A1A0378A}" type="datetimeFigureOut">
               <a:rPr lang="en-US" smtClean="0"/>
-              <a:t>12/6/2015</a:t>
+              <a:t>12/7/2015</a:t>
             </a:fld>
             <a:endParaRPr lang="en-US"/>
           </a:p>
@@ -1056,7 +1058,7 @@
           <a:p>
             <a:fld id="{AD627E06-CAEC-4B89-B66F-9B64A1A0378A}" type="datetimeFigureOut">
               <a:rPr lang="en-US" smtClean="0"/>
-              <a:t>12/6/2015</a:t>
+              <a:t>12/7/2015</a:t>
             </a:fld>
             <a:endParaRPr lang="en-US"/>
           </a:p>
@@ -1344,7 +1346,7 @@
           <a:p>
             <a:fld id="{AD627E06-CAEC-4B89-B66F-9B64A1A0378A}" type="datetimeFigureOut">
               <a:rPr lang="en-US" smtClean="0"/>
-              <a:t>12/6/2015</a:t>
+              <a:t>12/7/2015</a:t>
             </a:fld>
             <a:endParaRPr lang="en-US"/>
           </a:p>
@@ -1766,7 +1768,7 @@
           <a:p>
             <a:fld id="{AD627E06-CAEC-4B89-B66F-9B64A1A0378A}" type="datetimeFigureOut">
               <a:rPr lang="en-US" smtClean="0"/>
-              <a:t>12/6/2015</a:t>
+              <a:t>12/7/2015</a:t>
             </a:fld>
             <a:endParaRPr lang="en-US"/>
           </a:p>
@@ -1884,7 +1886,7 @@
           <a:p>
             <a:fld id="{AD627E06-CAEC-4B89-B66F-9B64A1A0378A}" type="datetimeFigureOut">
               <a:rPr lang="en-US" smtClean="0"/>
-              <a:t>12/6/2015</a:t>
+              <a:t>12/7/2015</a:t>
             </a:fld>
             <a:endParaRPr lang="en-US"/>
           </a:p>
@@ -1979,7 +1981,7 @@
           <a:p>
             <a:fld id="{AD627E06-CAEC-4B89-B66F-9B64A1A0378A}" type="datetimeFigureOut">
               <a:rPr lang="en-US" smtClean="0"/>
-              <a:t>12/6/2015</a:t>
+              <a:t>12/7/2015</a:t>
             </a:fld>
             <a:endParaRPr lang="en-US"/>
           </a:p>
@@ -2256,7 +2258,7 @@
           <a:p>
             <a:fld id="{AD627E06-CAEC-4B89-B66F-9B64A1A0378A}" type="datetimeFigureOut">
               <a:rPr lang="en-US" smtClean="0"/>
-              <a:t>12/6/2015</a:t>
+              <a:t>12/7/2015</a:t>
             </a:fld>
             <a:endParaRPr lang="en-US"/>
           </a:p>
@@ -2509,7 +2511,7 @@
           <a:p>
             <a:fld id="{AD627E06-CAEC-4B89-B66F-9B64A1A0378A}" type="datetimeFigureOut">
               <a:rPr lang="en-US" smtClean="0"/>
-              <a:t>12/6/2015</a:t>
+              <a:t>12/7/2015</a:t>
             </a:fld>
             <a:endParaRPr lang="en-US"/>
           </a:p>
@@ -2722,7 +2724,7 @@
           <a:p>
             <a:fld id="{AD627E06-CAEC-4B89-B66F-9B64A1A0378A}" type="datetimeFigureOut">
               <a:rPr lang="en-US" smtClean="0"/>
-              <a:t>12/6/2015</a:t>
+              <a:t>12/7/2015</a:t>
             </a:fld>
             <a:endParaRPr lang="en-US"/>
           </a:p>
@@ -8539,6 +8541,3870 @@
 </p:sld>
 </file>
 
+<file path=ppt/slides/slide4.xml><?xml version="1.0" encoding="utf-8"?>
+<p:sld xmlns:a="http://schemas.openxmlformats.org/drawingml/2006/main" xmlns:r="http://schemas.openxmlformats.org/officeDocument/2006/relationships" xmlns:p="http://schemas.openxmlformats.org/presentationml/2006/main">
+  <p:cSld>
+    <p:spTree>
+      <p:nvGrpSpPr>
+        <p:cNvPr id="1" name=""/>
+        <p:cNvGrpSpPr/>
+        <p:nvPr/>
+      </p:nvGrpSpPr>
+      <p:grpSpPr>
+        <a:xfrm>
+          <a:off x="0" y="0"/>
+          <a:ext cx="0" cy="0"/>
+          <a:chOff x="0" y="0"/>
+          <a:chExt cx="0" cy="0"/>
+        </a:xfrm>
+      </p:grpSpPr>
+      <p:grpSp>
+        <p:nvGrpSpPr>
+          <p:cNvPr id="68" name="Group 67"/>
+          <p:cNvGrpSpPr/>
+          <p:nvPr/>
+        </p:nvGrpSpPr>
+        <p:grpSpPr>
+          <a:xfrm>
+            <a:off x="851244" y="838200"/>
+            <a:ext cx="1219200" cy="533400"/>
+            <a:chOff x="914400" y="1524000"/>
+            <a:chExt cx="1219200" cy="533400"/>
+          </a:xfrm>
+        </p:grpSpPr>
+        <p:sp>
+          <p:nvSpPr>
+            <p:cNvPr id="69" name="Rectangle 68"/>
+            <p:cNvSpPr/>
+            <p:nvPr/>
+          </p:nvSpPr>
+          <p:spPr>
+            <a:xfrm>
+              <a:off x="914400" y="1524000"/>
+              <a:ext cx="1219200" cy="533400"/>
+            </a:xfrm>
+            <a:prstGeom prst="rect">
+              <a:avLst/>
+            </a:prstGeom>
+          </p:spPr>
+          <p:style>
+            <a:lnRef idx="2">
+              <a:schemeClr val="accent1">
+                <a:shade val="50000"/>
+              </a:schemeClr>
+            </a:lnRef>
+            <a:fillRef idx="1">
+              <a:schemeClr val="accent1"/>
+            </a:fillRef>
+            <a:effectRef idx="0">
+              <a:schemeClr val="accent1"/>
+            </a:effectRef>
+            <a:fontRef idx="minor">
+              <a:schemeClr val="lt1"/>
+            </a:fontRef>
+          </p:style>
+          <p:txBody>
+            <a:bodyPr rtlCol="0" anchor="ctr"/>
+            <a:lstStyle/>
+            <a:p>
+              <a:pPr algn="ctr"/>
+              <a:endParaRPr lang="en-US"/>
+            </a:p>
+          </p:txBody>
+        </p:sp>
+        <p:sp>
+          <p:nvSpPr>
+            <p:cNvPr id="70" name="Rectangle 69"/>
+            <p:cNvSpPr/>
+            <p:nvPr/>
+          </p:nvSpPr>
+          <p:spPr>
+            <a:xfrm>
+              <a:off x="1752600" y="1524000"/>
+              <a:ext cx="381000" cy="533400"/>
+            </a:xfrm>
+            <a:prstGeom prst="rect">
+              <a:avLst/>
+            </a:prstGeom>
+          </p:spPr>
+          <p:style>
+            <a:lnRef idx="2">
+              <a:schemeClr val="accent2">
+                <a:shade val="50000"/>
+              </a:schemeClr>
+            </a:lnRef>
+            <a:fillRef idx="1">
+              <a:schemeClr val="accent2"/>
+            </a:fillRef>
+            <a:effectRef idx="0">
+              <a:schemeClr val="accent2"/>
+            </a:effectRef>
+            <a:fontRef idx="minor">
+              <a:schemeClr val="lt1"/>
+            </a:fontRef>
+          </p:style>
+          <p:txBody>
+            <a:bodyPr rtlCol="0" anchor="ctr"/>
+            <a:lstStyle/>
+            <a:p>
+              <a:pPr algn="ctr"/>
+              <a:r>
+                <a:rPr lang="en-US" dirty="0"/>
+                <a:t>n</a:t>
+              </a:r>
+              <a:endParaRPr lang="en-US" dirty="0"/>
+            </a:p>
+          </p:txBody>
+        </p:sp>
+      </p:grpSp>
+      <p:sp>
+        <p:nvSpPr>
+          <p:cNvPr id="85" name="Oval 84"/>
+          <p:cNvSpPr/>
+          <p:nvPr/>
+        </p:nvSpPr>
+        <p:spPr>
+          <a:xfrm>
+            <a:off x="7252044" y="838200"/>
+            <a:ext cx="685800" cy="533400"/>
+          </a:xfrm>
+          <a:prstGeom prst="ellipse">
+            <a:avLst/>
+          </a:prstGeom>
+        </p:spPr>
+        <p:style>
+          <a:lnRef idx="1">
+            <a:schemeClr val="accent2"/>
+          </a:lnRef>
+          <a:fillRef idx="2">
+            <a:schemeClr val="accent2"/>
+          </a:fillRef>
+          <a:effectRef idx="1">
+            <a:schemeClr val="accent2"/>
+          </a:effectRef>
+          <a:fontRef idx="minor">
+            <a:schemeClr val="dk1"/>
+          </a:fontRef>
+        </p:style>
+        <p:txBody>
+          <a:bodyPr rtlCol="0" anchor="ctr"/>
+          <a:lstStyle/>
+          <a:p>
+            <a:pPr algn="ctr"/>
+            <a:r>
+              <a:rPr lang="en-US" altLang="zh-CN" sz="1100" dirty="0" smtClean="0"/>
+              <a:t>NULL</a:t>
+            </a:r>
+            <a:endParaRPr lang="en-US" sz="1100" dirty="0"/>
+          </a:p>
+        </p:txBody>
+      </p:sp>
+      <p:sp>
+        <p:nvSpPr>
+          <p:cNvPr id="86" name="Oval 85"/>
+          <p:cNvSpPr/>
+          <p:nvPr/>
+        </p:nvSpPr>
+        <p:spPr>
+          <a:xfrm>
+            <a:off x="317844" y="2057400"/>
+            <a:ext cx="1021772" cy="533400"/>
+          </a:xfrm>
+          <a:prstGeom prst="ellipse">
+            <a:avLst/>
+          </a:prstGeom>
+        </p:spPr>
+        <p:style>
+          <a:lnRef idx="2">
+            <a:schemeClr val="accent1">
+              <a:shade val="50000"/>
+            </a:schemeClr>
+          </a:lnRef>
+          <a:fillRef idx="1">
+            <a:schemeClr val="accent1"/>
+          </a:fillRef>
+          <a:effectRef idx="0">
+            <a:schemeClr val="accent1"/>
+          </a:effectRef>
+          <a:fontRef idx="minor">
+            <a:schemeClr val="lt1"/>
+          </a:fontRef>
+        </p:style>
+        <p:txBody>
+          <a:bodyPr rtlCol="0" anchor="ctr"/>
+          <a:lstStyle/>
+          <a:p>
+            <a:pPr algn="ctr"/>
+            <a:r>
+              <a:rPr lang="en-US" dirty="0" err="1" smtClean="0"/>
+              <a:t>prev</a:t>
+            </a:r>
+            <a:endParaRPr lang="en-US" dirty="0"/>
+          </a:p>
+        </p:txBody>
+      </p:sp>
+      <p:sp>
+        <p:nvSpPr>
+          <p:cNvPr id="88" name="Oval 87"/>
+          <p:cNvSpPr/>
+          <p:nvPr/>
+        </p:nvSpPr>
+        <p:spPr>
+          <a:xfrm>
+            <a:off x="1493278" y="2476500"/>
+            <a:ext cx="1021772" cy="533400"/>
+          </a:xfrm>
+          <a:prstGeom prst="ellipse">
+            <a:avLst/>
+          </a:prstGeom>
+        </p:spPr>
+        <p:style>
+          <a:lnRef idx="2">
+            <a:schemeClr val="accent1">
+              <a:shade val="50000"/>
+            </a:schemeClr>
+          </a:lnRef>
+          <a:fillRef idx="1">
+            <a:schemeClr val="accent1"/>
+          </a:fillRef>
+          <a:effectRef idx="0">
+            <a:schemeClr val="accent1"/>
+          </a:effectRef>
+          <a:fontRef idx="minor">
+            <a:schemeClr val="lt1"/>
+          </a:fontRef>
+        </p:style>
+        <p:txBody>
+          <a:bodyPr rtlCol="0" anchor="ctr"/>
+          <a:lstStyle/>
+          <a:p>
+            <a:pPr algn="ctr"/>
+            <a:r>
+              <a:rPr lang="en-US" altLang="zh-CN" dirty="0" smtClean="0"/>
+              <a:t>new</a:t>
+            </a:r>
+            <a:endParaRPr lang="en-US" dirty="0"/>
+          </a:p>
+        </p:txBody>
+      </p:sp>
+      <p:sp>
+        <p:nvSpPr>
+          <p:cNvPr id="90" name="Oval 89"/>
+          <p:cNvSpPr/>
+          <p:nvPr/>
+        </p:nvSpPr>
+        <p:spPr>
+          <a:xfrm>
+            <a:off x="4515772" y="2388727"/>
+            <a:ext cx="970628" cy="571500"/>
+          </a:xfrm>
+          <a:prstGeom prst="ellipse">
+            <a:avLst/>
+          </a:prstGeom>
+        </p:spPr>
+        <p:style>
+          <a:lnRef idx="2">
+            <a:schemeClr val="accent1">
+              <a:shade val="50000"/>
+            </a:schemeClr>
+          </a:lnRef>
+          <a:fillRef idx="1">
+            <a:schemeClr val="accent1"/>
+          </a:fillRef>
+          <a:effectRef idx="0">
+            <a:schemeClr val="accent1"/>
+          </a:effectRef>
+          <a:fontRef idx="minor">
+            <a:schemeClr val="lt1"/>
+          </a:fontRef>
+        </p:style>
+        <p:txBody>
+          <a:bodyPr rtlCol="0" anchor="ctr"/>
+          <a:lstStyle/>
+          <a:p>
+            <a:pPr algn="ctr"/>
+            <a:r>
+              <a:rPr lang="en-US" altLang="zh-CN" dirty="0" smtClean="0"/>
+              <a:t>next</a:t>
+            </a:r>
+            <a:endParaRPr lang="en-US" dirty="0"/>
+          </a:p>
+        </p:txBody>
+      </p:sp>
+      <p:sp>
+        <p:nvSpPr>
+          <p:cNvPr id="53" name="Rectangle 52"/>
+          <p:cNvSpPr/>
+          <p:nvPr/>
+        </p:nvSpPr>
+        <p:spPr>
+          <a:xfrm>
+            <a:off x="838200" y="838200"/>
+            <a:ext cx="381000" cy="533400"/>
+          </a:xfrm>
+          <a:prstGeom prst="rect">
+            <a:avLst/>
+          </a:prstGeom>
+        </p:spPr>
+        <p:style>
+          <a:lnRef idx="2">
+            <a:schemeClr val="accent2">
+              <a:shade val="50000"/>
+            </a:schemeClr>
+          </a:lnRef>
+          <a:fillRef idx="1">
+            <a:schemeClr val="accent2"/>
+          </a:fillRef>
+          <a:effectRef idx="0">
+            <a:schemeClr val="accent2"/>
+          </a:effectRef>
+          <a:fontRef idx="minor">
+            <a:schemeClr val="lt1"/>
+          </a:fontRef>
+        </p:style>
+        <p:txBody>
+          <a:bodyPr rtlCol="0" anchor="ctr"/>
+          <a:lstStyle/>
+          <a:p>
+            <a:pPr algn="ctr"/>
+            <a:r>
+              <a:rPr lang="en-US" dirty="0" smtClean="0"/>
+              <a:t>p</a:t>
+            </a:r>
+            <a:endParaRPr lang="en-US" dirty="0"/>
+          </a:p>
+        </p:txBody>
+      </p:sp>
+      <p:grpSp>
+        <p:nvGrpSpPr>
+          <p:cNvPr id="54" name="Group 53"/>
+          <p:cNvGrpSpPr/>
+          <p:nvPr/>
+        </p:nvGrpSpPr>
+        <p:grpSpPr>
+          <a:xfrm>
+            <a:off x="2743200" y="1767555"/>
+            <a:ext cx="1219200" cy="533400"/>
+            <a:chOff x="914400" y="1524000"/>
+            <a:chExt cx="1219200" cy="533400"/>
+          </a:xfrm>
+        </p:grpSpPr>
+        <p:sp>
+          <p:nvSpPr>
+            <p:cNvPr id="55" name="Rectangle 54"/>
+            <p:cNvSpPr/>
+            <p:nvPr/>
+          </p:nvSpPr>
+          <p:spPr>
+            <a:xfrm>
+              <a:off x="914400" y="1524000"/>
+              <a:ext cx="1219200" cy="533400"/>
+            </a:xfrm>
+            <a:prstGeom prst="rect">
+              <a:avLst/>
+            </a:prstGeom>
+          </p:spPr>
+          <p:style>
+            <a:lnRef idx="2">
+              <a:schemeClr val="accent1">
+                <a:shade val="50000"/>
+              </a:schemeClr>
+            </a:lnRef>
+            <a:fillRef idx="1">
+              <a:schemeClr val="accent1"/>
+            </a:fillRef>
+            <a:effectRef idx="0">
+              <a:schemeClr val="accent1"/>
+            </a:effectRef>
+            <a:fontRef idx="minor">
+              <a:schemeClr val="lt1"/>
+            </a:fontRef>
+          </p:style>
+          <p:txBody>
+            <a:bodyPr rtlCol="0" anchor="ctr"/>
+            <a:lstStyle/>
+            <a:p>
+              <a:pPr algn="ctr"/>
+              <a:endParaRPr lang="en-US"/>
+            </a:p>
+          </p:txBody>
+        </p:sp>
+        <p:sp>
+          <p:nvSpPr>
+            <p:cNvPr id="56" name="Rectangle 55"/>
+            <p:cNvSpPr/>
+            <p:nvPr/>
+          </p:nvSpPr>
+          <p:spPr>
+            <a:xfrm>
+              <a:off x="1752600" y="1524000"/>
+              <a:ext cx="381000" cy="533400"/>
+            </a:xfrm>
+            <a:prstGeom prst="rect">
+              <a:avLst/>
+            </a:prstGeom>
+          </p:spPr>
+          <p:style>
+            <a:lnRef idx="2">
+              <a:schemeClr val="accent2">
+                <a:shade val="50000"/>
+              </a:schemeClr>
+            </a:lnRef>
+            <a:fillRef idx="1">
+              <a:schemeClr val="accent2"/>
+            </a:fillRef>
+            <a:effectRef idx="0">
+              <a:schemeClr val="accent2"/>
+            </a:effectRef>
+            <a:fontRef idx="minor">
+              <a:schemeClr val="lt1"/>
+            </a:fontRef>
+          </p:style>
+          <p:txBody>
+            <a:bodyPr rtlCol="0" anchor="ctr"/>
+            <a:lstStyle/>
+            <a:p>
+              <a:pPr algn="ctr"/>
+              <a:r>
+                <a:rPr lang="en-US" dirty="0" smtClean="0"/>
+                <a:t>n</a:t>
+              </a:r>
+              <a:endParaRPr lang="en-US" dirty="0"/>
+            </a:p>
+          </p:txBody>
+        </p:sp>
+      </p:grpSp>
+      <p:sp>
+        <p:nvSpPr>
+          <p:cNvPr id="57" name="Rectangle 56"/>
+          <p:cNvSpPr/>
+          <p:nvPr/>
+        </p:nvSpPr>
+        <p:spPr>
+          <a:xfrm>
+            <a:off x="2730156" y="1767555"/>
+            <a:ext cx="381000" cy="533400"/>
+          </a:xfrm>
+          <a:prstGeom prst="rect">
+            <a:avLst/>
+          </a:prstGeom>
+        </p:spPr>
+        <p:style>
+          <a:lnRef idx="2">
+            <a:schemeClr val="accent2">
+              <a:shade val="50000"/>
+            </a:schemeClr>
+          </a:lnRef>
+          <a:fillRef idx="1">
+            <a:schemeClr val="accent2"/>
+          </a:fillRef>
+          <a:effectRef idx="0">
+            <a:schemeClr val="accent2"/>
+          </a:effectRef>
+          <a:fontRef idx="minor">
+            <a:schemeClr val="lt1"/>
+          </a:fontRef>
+        </p:style>
+        <p:txBody>
+          <a:bodyPr rtlCol="0" anchor="ctr"/>
+          <a:lstStyle/>
+          <a:p>
+            <a:pPr algn="ctr"/>
+            <a:r>
+              <a:rPr lang="en-US" dirty="0" smtClean="0"/>
+              <a:t>p</a:t>
+            </a:r>
+            <a:endParaRPr lang="en-US" dirty="0"/>
+          </a:p>
+        </p:txBody>
+      </p:sp>
+      <p:grpSp>
+        <p:nvGrpSpPr>
+          <p:cNvPr id="58" name="Group 57"/>
+          <p:cNvGrpSpPr/>
+          <p:nvPr/>
+        </p:nvGrpSpPr>
+        <p:grpSpPr>
+          <a:xfrm>
+            <a:off x="4648200" y="838200"/>
+            <a:ext cx="1219200" cy="533400"/>
+            <a:chOff x="914400" y="1524000"/>
+            <a:chExt cx="1219200" cy="533400"/>
+          </a:xfrm>
+        </p:grpSpPr>
+        <p:sp>
+          <p:nvSpPr>
+            <p:cNvPr id="59" name="Rectangle 58"/>
+            <p:cNvSpPr/>
+            <p:nvPr/>
+          </p:nvSpPr>
+          <p:spPr>
+            <a:xfrm>
+              <a:off x="914400" y="1524000"/>
+              <a:ext cx="1219200" cy="533400"/>
+            </a:xfrm>
+            <a:prstGeom prst="rect">
+              <a:avLst/>
+            </a:prstGeom>
+          </p:spPr>
+          <p:style>
+            <a:lnRef idx="2">
+              <a:schemeClr val="accent1">
+                <a:shade val="50000"/>
+              </a:schemeClr>
+            </a:lnRef>
+            <a:fillRef idx="1">
+              <a:schemeClr val="accent1"/>
+            </a:fillRef>
+            <a:effectRef idx="0">
+              <a:schemeClr val="accent1"/>
+            </a:effectRef>
+            <a:fontRef idx="minor">
+              <a:schemeClr val="lt1"/>
+            </a:fontRef>
+          </p:style>
+          <p:txBody>
+            <a:bodyPr rtlCol="0" anchor="ctr"/>
+            <a:lstStyle/>
+            <a:p>
+              <a:pPr algn="ctr"/>
+              <a:endParaRPr lang="en-US"/>
+            </a:p>
+          </p:txBody>
+        </p:sp>
+        <p:sp>
+          <p:nvSpPr>
+            <p:cNvPr id="60" name="Rectangle 59"/>
+            <p:cNvSpPr/>
+            <p:nvPr/>
+          </p:nvSpPr>
+          <p:spPr>
+            <a:xfrm>
+              <a:off x="1752600" y="1524000"/>
+              <a:ext cx="381000" cy="533400"/>
+            </a:xfrm>
+            <a:prstGeom prst="rect">
+              <a:avLst/>
+            </a:prstGeom>
+          </p:spPr>
+          <p:style>
+            <a:lnRef idx="2">
+              <a:schemeClr val="accent2">
+                <a:shade val="50000"/>
+              </a:schemeClr>
+            </a:lnRef>
+            <a:fillRef idx="1">
+              <a:schemeClr val="accent2"/>
+            </a:fillRef>
+            <a:effectRef idx="0">
+              <a:schemeClr val="accent2"/>
+            </a:effectRef>
+            <a:fontRef idx="minor">
+              <a:schemeClr val="lt1"/>
+            </a:fontRef>
+          </p:style>
+          <p:txBody>
+            <a:bodyPr rtlCol="0" anchor="ctr"/>
+            <a:lstStyle/>
+            <a:p>
+              <a:pPr algn="ctr"/>
+              <a:r>
+                <a:rPr lang="en-US" dirty="0" smtClean="0"/>
+                <a:t>n</a:t>
+              </a:r>
+              <a:endParaRPr lang="en-US" dirty="0"/>
+            </a:p>
+          </p:txBody>
+        </p:sp>
+      </p:grpSp>
+      <p:sp>
+        <p:nvSpPr>
+          <p:cNvPr id="61" name="Rectangle 60"/>
+          <p:cNvSpPr/>
+          <p:nvPr/>
+        </p:nvSpPr>
+        <p:spPr>
+          <a:xfrm>
+            <a:off x="4635156" y="838200"/>
+            <a:ext cx="381000" cy="533400"/>
+          </a:xfrm>
+          <a:prstGeom prst="rect">
+            <a:avLst/>
+          </a:prstGeom>
+        </p:spPr>
+        <p:style>
+          <a:lnRef idx="2">
+            <a:schemeClr val="accent2">
+              <a:shade val="50000"/>
+            </a:schemeClr>
+          </a:lnRef>
+          <a:fillRef idx="1">
+            <a:schemeClr val="accent2"/>
+          </a:fillRef>
+          <a:effectRef idx="0">
+            <a:schemeClr val="accent2"/>
+          </a:effectRef>
+          <a:fontRef idx="minor">
+            <a:schemeClr val="lt1"/>
+          </a:fontRef>
+        </p:style>
+        <p:txBody>
+          <a:bodyPr rtlCol="0" anchor="ctr"/>
+          <a:lstStyle/>
+          <a:p>
+            <a:pPr algn="ctr"/>
+            <a:r>
+              <a:rPr lang="en-US" dirty="0" smtClean="0"/>
+              <a:t>p</a:t>
+            </a:r>
+            <a:endParaRPr lang="en-US" dirty="0"/>
+          </a:p>
+        </p:txBody>
+      </p:sp>
+      <p:cxnSp>
+        <p:nvCxnSpPr>
+          <p:cNvPr id="3" name="Straight Arrow Connector 2"/>
+          <p:cNvCxnSpPr>
+            <a:stCxn id="86" idx="0"/>
+          </p:cNvCxnSpPr>
+          <p:nvPr/>
+        </p:nvCxnSpPr>
+        <p:spPr>
+          <a:xfrm flipV="1">
+            <a:off x="828730" y="1371600"/>
+            <a:ext cx="22514" cy="685800"/>
+          </a:xfrm>
+          <a:prstGeom prst="straightConnector1">
+            <a:avLst/>
+          </a:prstGeom>
+          <a:ln>
+            <a:tailEnd type="arrow"/>
+          </a:ln>
+        </p:spPr>
+        <p:style>
+          <a:lnRef idx="1">
+            <a:schemeClr val="accent1"/>
+          </a:lnRef>
+          <a:fillRef idx="0">
+            <a:schemeClr val="accent1"/>
+          </a:fillRef>
+          <a:effectRef idx="0">
+            <a:schemeClr val="accent1"/>
+          </a:effectRef>
+          <a:fontRef idx="minor">
+            <a:schemeClr val="tx1"/>
+          </a:fontRef>
+        </p:style>
+      </p:cxnSp>
+      <p:cxnSp>
+        <p:nvCxnSpPr>
+          <p:cNvPr id="5" name="Straight Arrow Connector 4"/>
+          <p:cNvCxnSpPr>
+            <a:stCxn id="90" idx="0"/>
+          </p:cNvCxnSpPr>
+          <p:nvPr/>
+        </p:nvCxnSpPr>
+        <p:spPr>
+          <a:xfrm flipH="1" flipV="1">
+            <a:off x="4648200" y="1371600"/>
+            <a:ext cx="352886" cy="1017127"/>
+          </a:xfrm>
+          <a:prstGeom prst="straightConnector1">
+            <a:avLst/>
+          </a:prstGeom>
+          <a:ln>
+            <a:tailEnd type="arrow"/>
+          </a:ln>
+        </p:spPr>
+        <p:style>
+          <a:lnRef idx="1">
+            <a:schemeClr val="accent1"/>
+          </a:lnRef>
+          <a:fillRef idx="0">
+            <a:schemeClr val="accent1"/>
+          </a:fillRef>
+          <a:effectRef idx="0">
+            <a:schemeClr val="accent1"/>
+          </a:effectRef>
+          <a:fontRef idx="minor">
+            <a:schemeClr val="tx1"/>
+          </a:fontRef>
+        </p:style>
+      </p:cxnSp>
+      <p:cxnSp>
+        <p:nvCxnSpPr>
+          <p:cNvPr id="7" name="Straight Arrow Connector 6"/>
+          <p:cNvCxnSpPr>
+            <a:stCxn id="69" idx="3"/>
+            <a:endCxn id="61" idx="1"/>
+          </p:cNvCxnSpPr>
+          <p:nvPr/>
+        </p:nvCxnSpPr>
+        <p:spPr>
+          <a:xfrm>
+            <a:off x="2070444" y="1104900"/>
+            <a:ext cx="2564712" cy="0"/>
+          </a:xfrm>
+          <a:prstGeom prst="straightConnector1">
+            <a:avLst/>
+          </a:prstGeom>
+          <a:ln>
+            <a:tailEnd type="arrow"/>
+          </a:ln>
+        </p:spPr>
+        <p:style>
+          <a:lnRef idx="1">
+            <a:schemeClr val="accent1"/>
+          </a:lnRef>
+          <a:fillRef idx="0">
+            <a:schemeClr val="accent1"/>
+          </a:fillRef>
+          <a:effectRef idx="0">
+            <a:schemeClr val="accent1"/>
+          </a:effectRef>
+          <a:fontRef idx="minor">
+            <a:schemeClr val="tx1"/>
+          </a:fontRef>
+        </p:style>
+      </p:cxnSp>
+      <p:cxnSp>
+        <p:nvCxnSpPr>
+          <p:cNvPr id="9" name="Straight Arrow Connector 8"/>
+          <p:cNvCxnSpPr>
+            <a:stCxn id="88" idx="0"/>
+          </p:cNvCxnSpPr>
+          <p:nvPr/>
+        </p:nvCxnSpPr>
+        <p:spPr>
+          <a:xfrm flipV="1">
+            <a:off x="2004164" y="2300955"/>
+            <a:ext cx="725992" cy="175545"/>
+          </a:xfrm>
+          <a:prstGeom prst="straightConnector1">
+            <a:avLst/>
+          </a:prstGeom>
+          <a:ln>
+            <a:tailEnd type="arrow"/>
+          </a:ln>
+        </p:spPr>
+        <p:style>
+          <a:lnRef idx="1">
+            <a:schemeClr val="accent1"/>
+          </a:lnRef>
+          <a:fillRef idx="0">
+            <a:schemeClr val="accent1"/>
+          </a:fillRef>
+          <a:effectRef idx="0">
+            <a:schemeClr val="accent1"/>
+          </a:effectRef>
+          <a:fontRef idx="minor">
+            <a:schemeClr val="tx1"/>
+          </a:fontRef>
+        </p:style>
+      </p:cxnSp>
+      <p:grpSp>
+        <p:nvGrpSpPr>
+          <p:cNvPr id="83" name="Group 82"/>
+          <p:cNvGrpSpPr/>
+          <p:nvPr/>
+        </p:nvGrpSpPr>
+        <p:grpSpPr>
+          <a:xfrm>
+            <a:off x="855292" y="4000500"/>
+            <a:ext cx="1219200" cy="533400"/>
+            <a:chOff x="914400" y="1524000"/>
+            <a:chExt cx="1219200" cy="533400"/>
+          </a:xfrm>
+        </p:grpSpPr>
+        <p:sp>
+          <p:nvSpPr>
+            <p:cNvPr id="84" name="Rectangle 83"/>
+            <p:cNvSpPr/>
+            <p:nvPr/>
+          </p:nvSpPr>
+          <p:spPr>
+            <a:xfrm>
+              <a:off x="914400" y="1524000"/>
+              <a:ext cx="1219200" cy="533400"/>
+            </a:xfrm>
+            <a:prstGeom prst="rect">
+              <a:avLst/>
+            </a:prstGeom>
+          </p:spPr>
+          <p:style>
+            <a:lnRef idx="2">
+              <a:schemeClr val="accent1">
+                <a:shade val="50000"/>
+              </a:schemeClr>
+            </a:lnRef>
+            <a:fillRef idx="1">
+              <a:schemeClr val="accent1"/>
+            </a:fillRef>
+            <a:effectRef idx="0">
+              <a:schemeClr val="accent1"/>
+            </a:effectRef>
+            <a:fontRef idx="minor">
+              <a:schemeClr val="lt1"/>
+            </a:fontRef>
+          </p:style>
+          <p:txBody>
+            <a:bodyPr rtlCol="0" anchor="ctr"/>
+            <a:lstStyle/>
+            <a:p>
+              <a:pPr algn="ctr"/>
+              <a:endParaRPr lang="en-US"/>
+            </a:p>
+          </p:txBody>
+        </p:sp>
+        <p:sp>
+          <p:nvSpPr>
+            <p:cNvPr id="95" name="Rectangle 94"/>
+            <p:cNvSpPr/>
+            <p:nvPr/>
+          </p:nvSpPr>
+          <p:spPr>
+            <a:xfrm>
+              <a:off x="1752600" y="1524000"/>
+              <a:ext cx="381000" cy="533400"/>
+            </a:xfrm>
+            <a:prstGeom prst="rect">
+              <a:avLst/>
+            </a:prstGeom>
+          </p:spPr>
+          <p:style>
+            <a:lnRef idx="2">
+              <a:schemeClr val="accent2">
+                <a:shade val="50000"/>
+              </a:schemeClr>
+            </a:lnRef>
+            <a:fillRef idx="1">
+              <a:schemeClr val="accent2"/>
+            </a:fillRef>
+            <a:effectRef idx="0">
+              <a:schemeClr val="accent2"/>
+            </a:effectRef>
+            <a:fontRef idx="minor">
+              <a:schemeClr val="lt1"/>
+            </a:fontRef>
+          </p:style>
+          <p:txBody>
+            <a:bodyPr rtlCol="0" anchor="ctr"/>
+            <a:lstStyle/>
+            <a:p>
+              <a:pPr algn="ctr"/>
+              <a:r>
+                <a:rPr lang="en-US" dirty="0" smtClean="0"/>
+                <a:t>n</a:t>
+              </a:r>
+              <a:endParaRPr lang="en-US" dirty="0"/>
+            </a:p>
+          </p:txBody>
+        </p:sp>
+      </p:grpSp>
+      <p:sp>
+        <p:nvSpPr>
+          <p:cNvPr id="96" name="Oval 95"/>
+          <p:cNvSpPr/>
+          <p:nvPr/>
+        </p:nvSpPr>
+        <p:spPr>
+          <a:xfrm>
+            <a:off x="7256092" y="4000500"/>
+            <a:ext cx="685800" cy="533400"/>
+          </a:xfrm>
+          <a:prstGeom prst="ellipse">
+            <a:avLst/>
+          </a:prstGeom>
+        </p:spPr>
+        <p:style>
+          <a:lnRef idx="1">
+            <a:schemeClr val="accent2"/>
+          </a:lnRef>
+          <a:fillRef idx="2">
+            <a:schemeClr val="accent2"/>
+          </a:fillRef>
+          <a:effectRef idx="1">
+            <a:schemeClr val="accent2"/>
+          </a:effectRef>
+          <a:fontRef idx="minor">
+            <a:schemeClr val="dk1"/>
+          </a:fontRef>
+        </p:style>
+        <p:txBody>
+          <a:bodyPr rtlCol="0" anchor="ctr"/>
+          <a:lstStyle/>
+          <a:p>
+            <a:pPr algn="ctr"/>
+            <a:r>
+              <a:rPr lang="en-US" altLang="zh-CN" sz="1100" dirty="0" smtClean="0"/>
+              <a:t>NULL</a:t>
+            </a:r>
+            <a:endParaRPr lang="en-US" sz="1100" dirty="0"/>
+          </a:p>
+        </p:txBody>
+      </p:sp>
+      <p:sp>
+        <p:nvSpPr>
+          <p:cNvPr id="102" name="Oval 101"/>
+          <p:cNvSpPr/>
+          <p:nvPr/>
+        </p:nvSpPr>
+        <p:spPr>
+          <a:xfrm>
+            <a:off x="321892" y="5219700"/>
+            <a:ext cx="1021772" cy="533400"/>
+          </a:xfrm>
+          <a:prstGeom prst="ellipse">
+            <a:avLst/>
+          </a:prstGeom>
+        </p:spPr>
+        <p:style>
+          <a:lnRef idx="2">
+            <a:schemeClr val="accent1">
+              <a:shade val="50000"/>
+            </a:schemeClr>
+          </a:lnRef>
+          <a:fillRef idx="1">
+            <a:schemeClr val="accent1"/>
+          </a:fillRef>
+          <a:effectRef idx="0">
+            <a:schemeClr val="accent1"/>
+          </a:effectRef>
+          <a:fontRef idx="minor">
+            <a:schemeClr val="lt1"/>
+          </a:fontRef>
+        </p:style>
+        <p:txBody>
+          <a:bodyPr rtlCol="0" anchor="ctr"/>
+          <a:lstStyle/>
+          <a:p>
+            <a:pPr algn="ctr"/>
+            <a:r>
+              <a:rPr lang="en-US" dirty="0" err="1" smtClean="0"/>
+              <a:t>prev</a:t>
+            </a:r>
+            <a:endParaRPr lang="en-US" dirty="0"/>
+          </a:p>
+        </p:txBody>
+      </p:sp>
+      <p:sp>
+        <p:nvSpPr>
+          <p:cNvPr id="104" name="Oval 103"/>
+          <p:cNvSpPr/>
+          <p:nvPr/>
+        </p:nvSpPr>
+        <p:spPr>
+          <a:xfrm>
+            <a:off x="1497326" y="5638800"/>
+            <a:ext cx="1021772" cy="533400"/>
+          </a:xfrm>
+          <a:prstGeom prst="ellipse">
+            <a:avLst/>
+          </a:prstGeom>
+        </p:spPr>
+        <p:style>
+          <a:lnRef idx="2">
+            <a:schemeClr val="accent1">
+              <a:shade val="50000"/>
+            </a:schemeClr>
+          </a:lnRef>
+          <a:fillRef idx="1">
+            <a:schemeClr val="accent1"/>
+          </a:fillRef>
+          <a:effectRef idx="0">
+            <a:schemeClr val="accent1"/>
+          </a:effectRef>
+          <a:fontRef idx="minor">
+            <a:schemeClr val="lt1"/>
+          </a:fontRef>
+        </p:style>
+        <p:txBody>
+          <a:bodyPr rtlCol="0" anchor="ctr"/>
+          <a:lstStyle/>
+          <a:p>
+            <a:pPr algn="ctr"/>
+            <a:r>
+              <a:rPr lang="en-US" altLang="zh-CN" dirty="0" smtClean="0"/>
+              <a:t>new</a:t>
+            </a:r>
+            <a:endParaRPr lang="en-US" dirty="0"/>
+          </a:p>
+        </p:txBody>
+      </p:sp>
+      <p:sp>
+        <p:nvSpPr>
+          <p:cNvPr id="112" name="Oval 111"/>
+          <p:cNvSpPr/>
+          <p:nvPr/>
+        </p:nvSpPr>
+        <p:spPr>
+          <a:xfrm>
+            <a:off x="4519820" y="5551027"/>
+            <a:ext cx="970628" cy="571500"/>
+          </a:xfrm>
+          <a:prstGeom prst="ellipse">
+            <a:avLst/>
+          </a:prstGeom>
+        </p:spPr>
+        <p:style>
+          <a:lnRef idx="2">
+            <a:schemeClr val="accent1">
+              <a:shade val="50000"/>
+            </a:schemeClr>
+          </a:lnRef>
+          <a:fillRef idx="1">
+            <a:schemeClr val="accent1"/>
+          </a:fillRef>
+          <a:effectRef idx="0">
+            <a:schemeClr val="accent1"/>
+          </a:effectRef>
+          <a:fontRef idx="minor">
+            <a:schemeClr val="lt1"/>
+          </a:fontRef>
+        </p:style>
+        <p:txBody>
+          <a:bodyPr rtlCol="0" anchor="ctr"/>
+          <a:lstStyle/>
+          <a:p>
+            <a:pPr algn="ctr"/>
+            <a:r>
+              <a:rPr lang="en-US" altLang="zh-CN" dirty="0" smtClean="0"/>
+              <a:t>next</a:t>
+            </a:r>
+            <a:endParaRPr lang="en-US" dirty="0"/>
+          </a:p>
+        </p:txBody>
+      </p:sp>
+      <p:sp>
+        <p:nvSpPr>
+          <p:cNvPr id="113" name="Rectangle 112"/>
+          <p:cNvSpPr/>
+          <p:nvPr/>
+        </p:nvSpPr>
+        <p:spPr>
+          <a:xfrm>
+            <a:off x="842248" y="4000500"/>
+            <a:ext cx="381000" cy="533400"/>
+          </a:xfrm>
+          <a:prstGeom prst="rect">
+            <a:avLst/>
+          </a:prstGeom>
+        </p:spPr>
+        <p:style>
+          <a:lnRef idx="2">
+            <a:schemeClr val="accent2">
+              <a:shade val="50000"/>
+            </a:schemeClr>
+          </a:lnRef>
+          <a:fillRef idx="1">
+            <a:schemeClr val="accent2"/>
+          </a:fillRef>
+          <a:effectRef idx="0">
+            <a:schemeClr val="accent2"/>
+          </a:effectRef>
+          <a:fontRef idx="minor">
+            <a:schemeClr val="lt1"/>
+          </a:fontRef>
+        </p:style>
+        <p:txBody>
+          <a:bodyPr rtlCol="0" anchor="ctr"/>
+          <a:lstStyle/>
+          <a:p>
+            <a:pPr algn="ctr"/>
+            <a:r>
+              <a:rPr lang="en-US" dirty="0" smtClean="0"/>
+              <a:t>p</a:t>
+            </a:r>
+            <a:endParaRPr lang="en-US" dirty="0"/>
+          </a:p>
+        </p:txBody>
+      </p:sp>
+      <p:grpSp>
+        <p:nvGrpSpPr>
+          <p:cNvPr id="114" name="Group 113"/>
+          <p:cNvGrpSpPr/>
+          <p:nvPr/>
+        </p:nvGrpSpPr>
+        <p:grpSpPr>
+          <a:xfrm>
+            <a:off x="2747248" y="4929855"/>
+            <a:ext cx="1219200" cy="533400"/>
+            <a:chOff x="914400" y="1524000"/>
+            <a:chExt cx="1219200" cy="533400"/>
+          </a:xfrm>
+        </p:grpSpPr>
+        <p:sp>
+          <p:nvSpPr>
+            <p:cNvPr id="115" name="Rectangle 114"/>
+            <p:cNvSpPr/>
+            <p:nvPr/>
+          </p:nvSpPr>
+          <p:spPr>
+            <a:xfrm>
+              <a:off x="914400" y="1524000"/>
+              <a:ext cx="1219200" cy="533400"/>
+            </a:xfrm>
+            <a:prstGeom prst="rect">
+              <a:avLst/>
+            </a:prstGeom>
+          </p:spPr>
+          <p:style>
+            <a:lnRef idx="2">
+              <a:schemeClr val="accent1">
+                <a:shade val="50000"/>
+              </a:schemeClr>
+            </a:lnRef>
+            <a:fillRef idx="1">
+              <a:schemeClr val="accent1"/>
+            </a:fillRef>
+            <a:effectRef idx="0">
+              <a:schemeClr val="accent1"/>
+            </a:effectRef>
+            <a:fontRef idx="minor">
+              <a:schemeClr val="lt1"/>
+            </a:fontRef>
+          </p:style>
+          <p:txBody>
+            <a:bodyPr rtlCol="0" anchor="ctr"/>
+            <a:lstStyle/>
+            <a:p>
+              <a:pPr algn="ctr"/>
+              <a:endParaRPr lang="en-US"/>
+            </a:p>
+          </p:txBody>
+        </p:sp>
+        <p:sp>
+          <p:nvSpPr>
+            <p:cNvPr id="116" name="Rectangle 115"/>
+            <p:cNvSpPr/>
+            <p:nvPr/>
+          </p:nvSpPr>
+          <p:spPr>
+            <a:xfrm>
+              <a:off x="1752600" y="1524000"/>
+              <a:ext cx="381000" cy="533400"/>
+            </a:xfrm>
+            <a:prstGeom prst="rect">
+              <a:avLst/>
+            </a:prstGeom>
+          </p:spPr>
+          <p:style>
+            <a:lnRef idx="2">
+              <a:schemeClr val="accent2">
+                <a:shade val="50000"/>
+              </a:schemeClr>
+            </a:lnRef>
+            <a:fillRef idx="1">
+              <a:schemeClr val="accent2"/>
+            </a:fillRef>
+            <a:effectRef idx="0">
+              <a:schemeClr val="accent2"/>
+            </a:effectRef>
+            <a:fontRef idx="minor">
+              <a:schemeClr val="lt1"/>
+            </a:fontRef>
+          </p:style>
+          <p:txBody>
+            <a:bodyPr rtlCol="0" anchor="ctr"/>
+            <a:lstStyle/>
+            <a:p>
+              <a:pPr algn="ctr"/>
+              <a:r>
+                <a:rPr lang="en-US" dirty="0" smtClean="0"/>
+                <a:t>n</a:t>
+              </a:r>
+              <a:endParaRPr lang="en-US" dirty="0"/>
+            </a:p>
+          </p:txBody>
+        </p:sp>
+      </p:grpSp>
+      <p:sp>
+        <p:nvSpPr>
+          <p:cNvPr id="127" name="Rectangle 126"/>
+          <p:cNvSpPr/>
+          <p:nvPr/>
+        </p:nvSpPr>
+        <p:spPr>
+          <a:xfrm>
+            <a:off x="2734204" y="4929855"/>
+            <a:ext cx="381000" cy="533400"/>
+          </a:xfrm>
+          <a:prstGeom prst="rect">
+            <a:avLst/>
+          </a:prstGeom>
+        </p:spPr>
+        <p:style>
+          <a:lnRef idx="2">
+            <a:schemeClr val="accent2">
+              <a:shade val="50000"/>
+            </a:schemeClr>
+          </a:lnRef>
+          <a:fillRef idx="1">
+            <a:schemeClr val="accent2"/>
+          </a:fillRef>
+          <a:effectRef idx="0">
+            <a:schemeClr val="accent2"/>
+          </a:effectRef>
+          <a:fontRef idx="minor">
+            <a:schemeClr val="lt1"/>
+          </a:fontRef>
+        </p:style>
+        <p:txBody>
+          <a:bodyPr rtlCol="0" anchor="ctr"/>
+          <a:lstStyle/>
+          <a:p>
+            <a:pPr algn="ctr"/>
+            <a:r>
+              <a:rPr lang="en-US" dirty="0" smtClean="0"/>
+              <a:t>p</a:t>
+            </a:r>
+            <a:endParaRPr lang="en-US" dirty="0"/>
+          </a:p>
+        </p:txBody>
+      </p:sp>
+      <p:grpSp>
+        <p:nvGrpSpPr>
+          <p:cNvPr id="128" name="Group 127"/>
+          <p:cNvGrpSpPr/>
+          <p:nvPr/>
+        </p:nvGrpSpPr>
+        <p:grpSpPr>
+          <a:xfrm>
+            <a:off x="4652248" y="4000500"/>
+            <a:ext cx="1219200" cy="533400"/>
+            <a:chOff x="914400" y="1524000"/>
+            <a:chExt cx="1219200" cy="533400"/>
+          </a:xfrm>
+        </p:grpSpPr>
+        <p:sp>
+          <p:nvSpPr>
+            <p:cNvPr id="129" name="Rectangle 128"/>
+            <p:cNvSpPr/>
+            <p:nvPr/>
+          </p:nvSpPr>
+          <p:spPr>
+            <a:xfrm>
+              <a:off x="914400" y="1524000"/>
+              <a:ext cx="1219200" cy="533400"/>
+            </a:xfrm>
+            <a:prstGeom prst="rect">
+              <a:avLst/>
+            </a:prstGeom>
+          </p:spPr>
+          <p:style>
+            <a:lnRef idx="2">
+              <a:schemeClr val="accent1">
+                <a:shade val="50000"/>
+              </a:schemeClr>
+            </a:lnRef>
+            <a:fillRef idx="1">
+              <a:schemeClr val="accent1"/>
+            </a:fillRef>
+            <a:effectRef idx="0">
+              <a:schemeClr val="accent1"/>
+            </a:effectRef>
+            <a:fontRef idx="minor">
+              <a:schemeClr val="lt1"/>
+            </a:fontRef>
+          </p:style>
+          <p:txBody>
+            <a:bodyPr rtlCol="0" anchor="ctr"/>
+            <a:lstStyle/>
+            <a:p>
+              <a:pPr algn="ctr"/>
+              <a:endParaRPr lang="en-US"/>
+            </a:p>
+          </p:txBody>
+        </p:sp>
+        <p:sp>
+          <p:nvSpPr>
+            <p:cNvPr id="130" name="Rectangle 129"/>
+            <p:cNvSpPr/>
+            <p:nvPr/>
+          </p:nvSpPr>
+          <p:spPr>
+            <a:xfrm>
+              <a:off x="1752600" y="1524000"/>
+              <a:ext cx="381000" cy="533400"/>
+            </a:xfrm>
+            <a:prstGeom prst="rect">
+              <a:avLst/>
+            </a:prstGeom>
+          </p:spPr>
+          <p:style>
+            <a:lnRef idx="2">
+              <a:schemeClr val="accent2">
+                <a:shade val="50000"/>
+              </a:schemeClr>
+            </a:lnRef>
+            <a:fillRef idx="1">
+              <a:schemeClr val="accent2"/>
+            </a:fillRef>
+            <a:effectRef idx="0">
+              <a:schemeClr val="accent2"/>
+            </a:effectRef>
+            <a:fontRef idx="minor">
+              <a:schemeClr val="lt1"/>
+            </a:fontRef>
+          </p:style>
+          <p:txBody>
+            <a:bodyPr rtlCol="0" anchor="ctr"/>
+            <a:lstStyle/>
+            <a:p>
+              <a:pPr algn="ctr"/>
+              <a:r>
+                <a:rPr lang="en-US" dirty="0" smtClean="0"/>
+                <a:t>n</a:t>
+              </a:r>
+              <a:endParaRPr lang="en-US" dirty="0"/>
+            </a:p>
+          </p:txBody>
+        </p:sp>
+      </p:grpSp>
+      <p:sp>
+        <p:nvSpPr>
+          <p:cNvPr id="131" name="Rectangle 130"/>
+          <p:cNvSpPr/>
+          <p:nvPr/>
+        </p:nvSpPr>
+        <p:spPr>
+          <a:xfrm>
+            <a:off x="4639204" y="4000500"/>
+            <a:ext cx="381000" cy="533400"/>
+          </a:xfrm>
+          <a:prstGeom prst="rect">
+            <a:avLst/>
+          </a:prstGeom>
+        </p:spPr>
+        <p:style>
+          <a:lnRef idx="2">
+            <a:schemeClr val="accent2">
+              <a:shade val="50000"/>
+            </a:schemeClr>
+          </a:lnRef>
+          <a:fillRef idx="1">
+            <a:schemeClr val="accent2"/>
+          </a:fillRef>
+          <a:effectRef idx="0">
+            <a:schemeClr val="accent2"/>
+          </a:effectRef>
+          <a:fontRef idx="minor">
+            <a:schemeClr val="lt1"/>
+          </a:fontRef>
+        </p:style>
+        <p:txBody>
+          <a:bodyPr rtlCol="0" anchor="ctr"/>
+          <a:lstStyle/>
+          <a:p>
+            <a:pPr algn="ctr"/>
+            <a:r>
+              <a:rPr lang="en-US" dirty="0" smtClean="0"/>
+              <a:t>p</a:t>
+            </a:r>
+            <a:endParaRPr lang="en-US" dirty="0"/>
+          </a:p>
+        </p:txBody>
+      </p:sp>
+      <p:cxnSp>
+        <p:nvCxnSpPr>
+          <p:cNvPr id="132" name="Straight Arrow Connector 131"/>
+          <p:cNvCxnSpPr>
+            <a:stCxn id="102" idx="0"/>
+          </p:cNvCxnSpPr>
+          <p:nvPr/>
+        </p:nvCxnSpPr>
+        <p:spPr>
+          <a:xfrm flipV="1">
+            <a:off x="832778" y="4533900"/>
+            <a:ext cx="22514" cy="685800"/>
+          </a:xfrm>
+          <a:prstGeom prst="straightConnector1">
+            <a:avLst/>
+          </a:prstGeom>
+          <a:ln>
+            <a:tailEnd type="arrow"/>
+          </a:ln>
+        </p:spPr>
+        <p:style>
+          <a:lnRef idx="1">
+            <a:schemeClr val="accent1"/>
+          </a:lnRef>
+          <a:fillRef idx="0">
+            <a:schemeClr val="accent1"/>
+          </a:fillRef>
+          <a:effectRef idx="0">
+            <a:schemeClr val="accent1"/>
+          </a:effectRef>
+          <a:fontRef idx="minor">
+            <a:schemeClr val="tx1"/>
+          </a:fontRef>
+        </p:style>
+      </p:cxnSp>
+      <p:cxnSp>
+        <p:nvCxnSpPr>
+          <p:cNvPr id="133" name="Straight Arrow Connector 132"/>
+          <p:cNvCxnSpPr>
+            <a:stCxn id="112" idx="0"/>
+          </p:cNvCxnSpPr>
+          <p:nvPr/>
+        </p:nvCxnSpPr>
+        <p:spPr>
+          <a:xfrm flipH="1" flipV="1">
+            <a:off x="4652248" y="4533900"/>
+            <a:ext cx="352886" cy="1017127"/>
+          </a:xfrm>
+          <a:prstGeom prst="straightConnector1">
+            <a:avLst/>
+          </a:prstGeom>
+          <a:ln>
+            <a:tailEnd type="arrow"/>
+          </a:ln>
+        </p:spPr>
+        <p:style>
+          <a:lnRef idx="1">
+            <a:schemeClr val="accent1"/>
+          </a:lnRef>
+          <a:fillRef idx="0">
+            <a:schemeClr val="accent1"/>
+          </a:fillRef>
+          <a:effectRef idx="0">
+            <a:schemeClr val="accent1"/>
+          </a:effectRef>
+          <a:fontRef idx="minor">
+            <a:schemeClr val="tx1"/>
+          </a:fontRef>
+        </p:style>
+      </p:cxnSp>
+      <p:cxnSp>
+        <p:nvCxnSpPr>
+          <p:cNvPr id="135" name="Straight Arrow Connector 134"/>
+          <p:cNvCxnSpPr>
+            <a:stCxn id="104" idx="0"/>
+          </p:cNvCxnSpPr>
+          <p:nvPr/>
+        </p:nvCxnSpPr>
+        <p:spPr>
+          <a:xfrm flipV="1">
+            <a:off x="2008212" y="5463255"/>
+            <a:ext cx="725992" cy="175545"/>
+          </a:xfrm>
+          <a:prstGeom prst="straightConnector1">
+            <a:avLst/>
+          </a:prstGeom>
+          <a:ln>
+            <a:tailEnd type="arrow"/>
+          </a:ln>
+        </p:spPr>
+        <p:style>
+          <a:lnRef idx="1">
+            <a:schemeClr val="accent1"/>
+          </a:lnRef>
+          <a:fillRef idx="0">
+            <a:schemeClr val="accent1"/>
+          </a:fillRef>
+          <a:effectRef idx="0">
+            <a:schemeClr val="accent1"/>
+          </a:effectRef>
+          <a:fontRef idx="minor">
+            <a:schemeClr val="tx1"/>
+          </a:fontRef>
+        </p:style>
+      </p:cxnSp>
+      <p:cxnSp>
+        <p:nvCxnSpPr>
+          <p:cNvPr id="16" name="Straight Arrow Connector 15"/>
+          <p:cNvCxnSpPr>
+            <a:stCxn id="129" idx="1"/>
+          </p:cNvCxnSpPr>
+          <p:nvPr/>
+        </p:nvCxnSpPr>
+        <p:spPr>
+          <a:xfrm flipH="1">
+            <a:off x="2730156" y="4267200"/>
+            <a:ext cx="1922092" cy="662655"/>
+          </a:xfrm>
+          <a:prstGeom prst="straightConnector1">
+            <a:avLst/>
+          </a:prstGeom>
+          <a:ln>
+            <a:tailEnd type="arrow"/>
+          </a:ln>
+        </p:spPr>
+        <p:style>
+          <a:lnRef idx="1">
+            <a:schemeClr val="accent1"/>
+          </a:lnRef>
+          <a:fillRef idx="0">
+            <a:schemeClr val="accent1"/>
+          </a:fillRef>
+          <a:effectRef idx="0">
+            <a:schemeClr val="accent1"/>
+          </a:effectRef>
+          <a:fontRef idx="minor">
+            <a:schemeClr val="tx1"/>
+          </a:fontRef>
+        </p:style>
+      </p:cxnSp>
+      <p:sp>
+        <p:nvSpPr>
+          <p:cNvPr id="17" name="Oval 16"/>
+          <p:cNvSpPr/>
+          <p:nvPr/>
+        </p:nvSpPr>
+        <p:spPr>
+          <a:xfrm>
+            <a:off x="3352800" y="4340638"/>
+            <a:ext cx="245692" cy="278273"/>
+          </a:xfrm>
+          <a:prstGeom prst="ellipse">
+            <a:avLst/>
+          </a:prstGeom>
+        </p:spPr>
+        <p:style>
+          <a:lnRef idx="2">
+            <a:schemeClr val="accent1">
+              <a:shade val="50000"/>
+            </a:schemeClr>
+          </a:lnRef>
+          <a:fillRef idx="1">
+            <a:schemeClr val="accent1"/>
+          </a:fillRef>
+          <a:effectRef idx="0">
+            <a:schemeClr val="accent1"/>
+          </a:effectRef>
+          <a:fontRef idx="minor">
+            <a:schemeClr val="lt1"/>
+          </a:fontRef>
+        </p:style>
+        <p:txBody>
+          <a:bodyPr rtlCol="0" anchor="ctr"/>
+          <a:lstStyle/>
+          <a:p>
+            <a:pPr algn="ctr"/>
+            <a:r>
+              <a:rPr lang="en-US" dirty="0" smtClean="0"/>
+              <a:t>1</a:t>
+            </a:r>
+            <a:endParaRPr lang="en-US" dirty="0"/>
+          </a:p>
+        </p:txBody>
+      </p:sp>
+      <p:cxnSp>
+        <p:nvCxnSpPr>
+          <p:cNvPr id="19" name="Straight Arrow Connector 18"/>
+          <p:cNvCxnSpPr>
+            <a:stCxn id="115" idx="3"/>
+          </p:cNvCxnSpPr>
+          <p:nvPr/>
+        </p:nvCxnSpPr>
+        <p:spPr>
+          <a:xfrm flipV="1">
+            <a:off x="3966448" y="4533900"/>
+            <a:ext cx="668708" cy="662655"/>
+          </a:xfrm>
+          <a:prstGeom prst="straightConnector1">
+            <a:avLst/>
+          </a:prstGeom>
+          <a:ln>
+            <a:tailEnd type="arrow"/>
+          </a:ln>
+        </p:spPr>
+        <p:style>
+          <a:lnRef idx="1">
+            <a:schemeClr val="accent1"/>
+          </a:lnRef>
+          <a:fillRef idx="0">
+            <a:schemeClr val="accent1"/>
+          </a:fillRef>
+          <a:effectRef idx="0">
+            <a:schemeClr val="accent1"/>
+          </a:effectRef>
+          <a:fontRef idx="minor">
+            <a:schemeClr val="tx1"/>
+          </a:fontRef>
+        </p:style>
+      </p:cxnSp>
+      <p:sp>
+        <p:nvSpPr>
+          <p:cNvPr id="136" name="Oval 135"/>
+          <p:cNvSpPr/>
+          <p:nvPr/>
+        </p:nvSpPr>
+        <p:spPr>
+          <a:xfrm>
+            <a:off x="4177956" y="4538082"/>
+            <a:ext cx="245692" cy="278273"/>
+          </a:xfrm>
+          <a:prstGeom prst="ellipse">
+            <a:avLst/>
+          </a:prstGeom>
+        </p:spPr>
+        <p:style>
+          <a:lnRef idx="2">
+            <a:schemeClr val="accent1">
+              <a:shade val="50000"/>
+            </a:schemeClr>
+          </a:lnRef>
+          <a:fillRef idx="1">
+            <a:schemeClr val="accent1"/>
+          </a:fillRef>
+          <a:effectRef idx="0">
+            <a:schemeClr val="accent1"/>
+          </a:effectRef>
+          <a:fontRef idx="minor">
+            <a:schemeClr val="lt1"/>
+          </a:fontRef>
+        </p:style>
+        <p:txBody>
+          <a:bodyPr rtlCol="0" anchor="ctr"/>
+          <a:lstStyle/>
+          <a:p>
+            <a:pPr algn="ctr"/>
+            <a:r>
+              <a:rPr lang="en-US" dirty="0" smtClean="0"/>
+              <a:t>2</a:t>
+            </a:r>
+            <a:endParaRPr lang="en-US" dirty="0"/>
+          </a:p>
+        </p:txBody>
+      </p:sp>
+      <p:cxnSp>
+        <p:nvCxnSpPr>
+          <p:cNvPr id="21" name="Straight Arrow Connector 20"/>
+          <p:cNvCxnSpPr>
+            <a:stCxn id="127" idx="1"/>
+          </p:cNvCxnSpPr>
+          <p:nvPr/>
+        </p:nvCxnSpPr>
+        <p:spPr>
+          <a:xfrm flipH="1" flipV="1">
+            <a:off x="828730" y="4538082"/>
+            <a:ext cx="1905474" cy="658473"/>
+          </a:xfrm>
+          <a:prstGeom prst="straightConnector1">
+            <a:avLst/>
+          </a:prstGeom>
+          <a:ln>
+            <a:tailEnd type="arrow"/>
+          </a:ln>
+        </p:spPr>
+        <p:style>
+          <a:lnRef idx="1">
+            <a:schemeClr val="accent1"/>
+          </a:lnRef>
+          <a:fillRef idx="0">
+            <a:schemeClr val="accent1"/>
+          </a:fillRef>
+          <a:effectRef idx="0">
+            <a:schemeClr val="accent1"/>
+          </a:effectRef>
+          <a:fontRef idx="minor">
+            <a:schemeClr val="tx1"/>
+          </a:fontRef>
+        </p:style>
+      </p:cxnSp>
+      <p:sp>
+        <p:nvSpPr>
+          <p:cNvPr id="137" name="Oval 136"/>
+          <p:cNvSpPr/>
+          <p:nvPr/>
+        </p:nvSpPr>
+        <p:spPr>
+          <a:xfrm>
+            <a:off x="2004164" y="4686653"/>
+            <a:ext cx="245692" cy="278273"/>
+          </a:xfrm>
+          <a:prstGeom prst="ellipse">
+            <a:avLst/>
+          </a:prstGeom>
+        </p:spPr>
+        <p:style>
+          <a:lnRef idx="2">
+            <a:schemeClr val="accent1">
+              <a:shade val="50000"/>
+            </a:schemeClr>
+          </a:lnRef>
+          <a:fillRef idx="1">
+            <a:schemeClr val="accent1"/>
+          </a:fillRef>
+          <a:effectRef idx="0">
+            <a:schemeClr val="accent1"/>
+          </a:effectRef>
+          <a:fontRef idx="minor">
+            <a:schemeClr val="lt1"/>
+          </a:fontRef>
+        </p:style>
+        <p:txBody>
+          <a:bodyPr rtlCol="0" anchor="ctr"/>
+          <a:lstStyle/>
+          <a:p>
+            <a:pPr algn="ctr"/>
+            <a:r>
+              <a:rPr lang="en-US" dirty="0" smtClean="0"/>
+              <a:t>3</a:t>
+            </a:r>
+            <a:endParaRPr lang="en-US" dirty="0"/>
+          </a:p>
+        </p:txBody>
+      </p:sp>
+      <p:cxnSp>
+        <p:nvCxnSpPr>
+          <p:cNvPr id="23" name="Straight Arrow Connector 22"/>
+          <p:cNvCxnSpPr>
+            <a:stCxn id="95" idx="3"/>
+          </p:cNvCxnSpPr>
+          <p:nvPr/>
+        </p:nvCxnSpPr>
+        <p:spPr>
+          <a:xfrm>
+            <a:off x="2074492" y="4267200"/>
+            <a:ext cx="655664" cy="697726"/>
+          </a:xfrm>
+          <a:prstGeom prst="straightConnector1">
+            <a:avLst/>
+          </a:prstGeom>
+          <a:ln>
+            <a:tailEnd type="arrow"/>
+          </a:ln>
+        </p:spPr>
+        <p:style>
+          <a:lnRef idx="1">
+            <a:schemeClr val="accent1"/>
+          </a:lnRef>
+          <a:fillRef idx="0">
+            <a:schemeClr val="accent1"/>
+          </a:fillRef>
+          <a:effectRef idx="0">
+            <a:schemeClr val="accent1"/>
+          </a:effectRef>
+          <a:fontRef idx="minor">
+            <a:schemeClr val="tx1"/>
+          </a:fontRef>
+        </p:style>
+      </p:cxnSp>
+      <p:sp>
+        <p:nvSpPr>
+          <p:cNvPr id="138" name="Oval 137"/>
+          <p:cNvSpPr/>
+          <p:nvPr/>
+        </p:nvSpPr>
+        <p:spPr>
+          <a:xfrm>
+            <a:off x="2421308" y="4446127"/>
+            <a:ext cx="245692" cy="278273"/>
+          </a:xfrm>
+          <a:prstGeom prst="ellipse">
+            <a:avLst/>
+          </a:prstGeom>
+        </p:spPr>
+        <p:style>
+          <a:lnRef idx="2">
+            <a:schemeClr val="accent1">
+              <a:shade val="50000"/>
+            </a:schemeClr>
+          </a:lnRef>
+          <a:fillRef idx="1">
+            <a:schemeClr val="accent1"/>
+          </a:fillRef>
+          <a:effectRef idx="0">
+            <a:schemeClr val="accent1"/>
+          </a:effectRef>
+          <a:fontRef idx="minor">
+            <a:schemeClr val="lt1"/>
+          </a:fontRef>
+        </p:style>
+        <p:txBody>
+          <a:bodyPr rtlCol="0" anchor="ctr"/>
+          <a:lstStyle/>
+          <a:p>
+            <a:pPr algn="ctr"/>
+            <a:r>
+              <a:rPr lang="en-US" dirty="0" smtClean="0"/>
+              <a:t>4</a:t>
+            </a:r>
+            <a:endParaRPr lang="en-US" dirty="0"/>
+          </a:p>
+        </p:txBody>
+      </p:sp>
+      <p:cxnSp>
+        <p:nvCxnSpPr>
+          <p:cNvPr id="31" name="Straight Arrow Connector 30"/>
+          <p:cNvCxnSpPr/>
+          <p:nvPr/>
+        </p:nvCxnSpPr>
+        <p:spPr>
+          <a:xfrm>
+            <a:off x="828730" y="533399"/>
+            <a:ext cx="9470" cy="304802"/>
+          </a:xfrm>
+          <a:prstGeom prst="straightConnector1">
+            <a:avLst/>
+          </a:prstGeom>
+          <a:ln>
+            <a:tailEnd type="arrow"/>
+          </a:ln>
+        </p:spPr>
+        <p:style>
+          <a:lnRef idx="1">
+            <a:schemeClr val="accent1"/>
+          </a:lnRef>
+          <a:fillRef idx="0">
+            <a:schemeClr val="accent1"/>
+          </a:fillRef>
+          <a:effectRef idx="0">
+            <a:schemeClr val="accent1"/>
+          </a:effectRef>
+          <a:fontRef idx="minor">
+            <a:schemeClr val="tx1"/>
+          </a:fontRef>
+        </p:style>
+      </p:cxnSp>
+      <p:cxnSp>
+        <p:nvCxnSpPr>
+          <p:cNvPr id="34" name="Elbow Connector 33"/>
+          <p:cNvCxnSpPr/>
+          <p:nvPr/>
+        </p:nvCxnSpPr>
+        <p:spPr>
+          <a:xfrm>
+            <a:off x="828730" y="533399"/>
+            <a:ext cx="3806426" cy="457201"/>
+          </a:xfrm>
+          <a:prstGeom prst="bentConnector3">
+            <a:avLst/>
+          </a:prstGeom>
+        </p:spPr>
+        <p:style>
+          <a:lnRef idx="1">
+            <a:schemeClr val="accent1"/>
+          </a:lnRef>
+          <a:fillRef idx="0">
+            <a:schemeClr val="accent1"/>
+          </a:fillRef>
+          <a:effectRef idx="0">
+            <a:schemeClr val="accent1"/>
+          </a:effectRef>
+          <a:fontRef idx="minor">
+            <a:schemeClr val="tx1"/>
+          </a:fontRef>
+        </p:style>
+      </p:cxnSp>
+      <p:cxnSp>
+        <p:nvCxnSpPr>
+          <p:cNvPr id="36" name="Straight Arrow Connector 35"/>
+          <p:cNvCxnSpPr>
+            <a:endCxn id="85" idx="2"/>
+          </p:cNvCxnSpPr>
+          <p:nvPr/>
+        </p:nvCxnSpPr>
+        <p:spPr>
+          <a:xfrm>
+            <a:off x="5871448" y="1104900"/>
+            <a:ext cx="1380596" cy="0"/>
+          </a:xfrm>
+          <a:prstGeom prst="straightConnector1">
+            <a:avLst/>
+          </a:prstGeom>
+          <a:ln>
+            <a:tailEnd type="arrow"/>
+          </a:ln>
+        </p:spPr>
+        <p:style>
+          <a:lnRef idx="1">
+            <a:schemeClr val="accent1"/>
+          </a:lnRef>
+          <a:fillRef idx="0">
+            <a:schemeClr val="accent1"/>
+          </a:fillRef>
+          <a:effectRef idx="0">
+            <a:schemeClr val="accent1"/>
+          </a:effectRef>
+          <a:fontRef idx="minor">
+            <a:schemeClr val="tx1"/>
+          </a:fontRef>
+        </p:style>
+      </p:cxnSp>
+      <p:cxnSp>
+        <p:nvCxnSpPr>
+          <p:cNvPr id="39" name="Straight Arrow Connector 38"/>
+          <p:cNvCxnSpPr>
+            <a:stCxn id="129" idx="3"/>
+            <a:endCxn id="96" idx="2"/>
+          </p:cNvCxnSpPr>
+          <p:nvPr/>
+        </p:nvCxnSpPr>
+        <p:spPr>
+          <a:xfrm>
+            <a:off x="5871448" y="4267200"/>
+            <a:ext cx="1384644" cy="0"/>
+          </a:xfrm>
+          <a:prstGeom prst="straightConnector1">
+            <a:avLst/>
+          </a:prstGeom>
+          <a:ln>
+            <a:tailEnd type="arrow"/>
+          </a:ln>
+        </p:spPr>
+        <p:style>
+          <a:lnRef idx="1">
+            <a:schemeClr val="accent1"/>
+          </a:lnRef>
+          <a:fillRef idx="0">
+            <a:schemeClr val="accent1"/>
+          </a:fillRef>
+          <a:effectRef idx="0">
+            <a:schemeClr val="accent1"/>
+          </a:effectRef>
+          <a:fontRef idx="minor">
+            <a:schemeClr val="tx1"/>
+          </a:fontRef>
+        </p:style>
+      </p:cxnSp>
+    </p:spTree>
+    <p:extLst>
+      <p:ext uri="{BB962C8B-B14F-4D97-AF65-F5344CB8AC3E}">
+        <p14:creationId xmlns:p14="http://schemas.microsoft.com/office/powerpoint/2010/main" val="1686938846"/>
+      </p:ext>
+    </p:extLst>
+  </p:cSld>
+  <p:clrMapOvr>
+    <a:masterClrMapping/>
+  </p:clrMapOvr>
+</p:sld>
+</file>
+
+<file path=ppt/slides/slide5.xml><?xml version="1.0" encoding="utf-8"?>
+<p:sld xmlns:a="http://schemas.openxmlformats.org/drawingml/2006/main" xmlns:r="http://schemas.openxmlformats.org/officeDocument/2006/relationships" xmlns:p="http://schemas.openxmlformats.org/presentationml/2006/main">
+  <p:cSld>
+    <p:spTree>
+      <p:nvGrpSpPr>
+        <p:cNvPr id="1" name=""/>
+        <p:cNvGrpSpPr/>
+        <p:nvPr/>
+      </p:nvGrpSpPr>
+      <p:grpSpPr>
+        <a:xfrm>
+          <a:off x="0" y="0"/>
+          <a:ext cx="0" cy="0"/>
+          <a:chOff x="0" y="0"/>
+          <a:chExt cx="0" cy="0"/>
+        </a:xfrm>
+      </p:grpSpPr>
+      <p:grpSp>
+        <p:nvGrpSpPr>
+          <p:cNvPr id="68" name="Group 67"/>
+          <p:cNvGrpSpPr/>
+          <p:nvPr/>
+        </p:nvGrpSpPr>
+        <p:grpSpPr>
+          <a:xfrm>
+            <a:off x="851244" y="838200"/>
+            <a:ext cx="1219200" cy="533400"/>
+            <a:chOff x="914400" y="1524000"/>
+            <a:chExt cx="1219200" cy="533400"/>
+          </a:xfrm>
+        </p:grpSpPr>
+        <p:sp>
+          <p:nvSpPr>
+            <p:cNvPr id="69" name="Rectangle 68"/>
+            <p:cNvSpPr/>
+            <p:nvPr/>
+          </p:nvSpPr>
+          <p:spPr>
+            <a:xfrm>
+              <a:off x="914400" y="1524000"/>
+              <a:ext cx="1219200" cy="533400"/>
+            </a:xfrm>
+            <a:prstGeom prst="rect">
+              <a:avLst/>
+            </a:prstGeom>
+          </p:spPr>
+          <p:style>
+            <a:lnRef idx="2">
+              <a:schemeClr val="accent1">
+                <a:shade val="50000"/>
+              </a:schemeClr>
+            </a:lnRef>
+            <a:fillRef idx="1">
+              <a:schemeClr val="accent1"/>
+            </a:fillRef>
+            <a:effectRef idx="0">
+              <a:schemeClr val="accent1"/>
+            </a:effectRef>
+            <a:fontRef idx="minor">
+              <a:schemeClr val="lt1"/>
+            </a:fontRef>
+          </p:style>
+          <p:txBody>
+            <a:bodyPr rtlCol="0" anchor="ctr"/>
+            <a:lstStyle/>
+            <a:p>
+              <a:pPr algn="ctr"/>
+              <a:endParaRPr lang="en-US"/>
+            </a:p>
+          </p:txBody>
+        </p:sp>
+        <p:sp>
+          <p:nvSpPr>
+            <p:cNvPr id="70" name="Rectangle 69"/>
+            <p:cNvSpPr/>
+            <p:nvPr/>
+          </p:nvSpPr>
+          <p:spPr>
+            <a:xfrm>
+              <a:off x="1752600" y="1524000"/>
+              <a:ext cx="381000" cy="533400"/>
+            </a:xfrm>
+            <a:prstGeom prst="rect">
+              <a:avLst/>
+            </a:prstGeom>
+          </p:spPr>
+          <p:style>
+            <a:lnRef idx="2">
+              <a:schemeClr val="accent2">
+                <a:shade val="50000"/>
+              </a:schemeClr>
+            </a:lnRef>
+            <a:fillRef idx="1">
+              <a:schemeClr val="accent2"/>
+            </a:fillRef>
+            <a:effectRef idx="0">
+              <a:schemeClr val="accent2"/>
+            </a:effectRef>
+            <a:fontRef idx="minor">
+              <a:schemeClr val="lt1"/>
+            </a:fontRef>
+          </p:style>
+          <p:txBody>
+            <a:bodyPr rtlCol="0" anchor="ctr"/>
+            <a:lstStyle/>
+            <a:p>
+              <a:pPr algn="ctr"/>
+              <a:r>
+                <a:rPr lang="en-US" dirty="0"/>
+                <a:t>n</a:t>
+              </a:r>
+              <a:endParaRPr lang="en-US" dirty="0"/>
+            </a:p>
+          </p:txBody>
+        </p:sp>
+      </p:grpSp>
+      <p:sp>
+        <p:nvSpPr>
+          <p:cNvPr id="85" name="Oval 84"/>
+          <p:cNvSpPr/>
+          <p:nvPr/>
+        </p:nvSpPr>
+        <p:spPr>
+          <a:xfrm>
+            <a:off x="7252044" y="838200"/>
+            <a:ext cx="685800" cy="533400"/>
+          </a:xfrm>
+          <a:prstGeom prst="ellipse">
+            <a:avLst/>
+          </a:prstGeom>
+        </p:spPr>
+        <p:style>
+          <a:lnRef idx="1">
+            <a:schemeClr val="accent2"/>
+          </a:lnRef>
+          <a:fillRef idx="2">
+            <a:schemeClr val="accent2"/>
+          </a:fillRef>
+          <a:effectRef idx="1">
+            <a:schemeClr val="accent2"/>
+          </a:effectRef>
+          <a:fontRef idx="minor">
+            <a:schemeClr val="dk1"/>
+          </a:fontRef>
+        </p:style>
+        <p:txBody>
+          <a:bodyPr rtlCol="0" anchor="ctr"/>
+          <a:lstStyle/>
+          <a:p>
+            <a:pPr algn="ctr"/>
+            <a:r>
+              <a:rPr lang="en-US" altLang="zh-CN" sz="1100" dirty="0" smtClean="0"/>
+              <a:t>NULL</a:t>
+            </a:r>
+            <a:endParaRPr lang="en-US" sz="1100" dirty="0"/>
+          </a:p>
+        </p:txBody>
+      </p:sp>
+      <p:sp>
+        <p:nvSpPr>
+          <p:cNvPr id="86" name="Oval 85"/>
+          <p:cNvSpPr/>
+          <p:nvPr/>
+        </p:nvSpPr>
+        <p:spPr>
+          <a:xfrm>
+            <a:off x="317844" y="2057400"/>
+            <a:ext cx="1021772" cy="533400"/>
+          </a:xfrm>
+          <a:prstGeom prst="ellipse">
+            <a:avLst/>
+          </a:prstGeom>
+        </p:spPr>
+        <p:style>
+          <a:lnRef idx="2">
+            <a:schemeClr val="accent1">
+              <a:shade val="50000"/>
+            </a:schemeClr>
+          </a:lnRef>
+          <a:fillRef idx="1">
+            <a:schemeClr val="accent1"/>
+          </a:fillRef>
+          <a:effectRef idx="0">
+            <a:schemeClr val="accent1"/>
+          </a:effectRef>
+          <a:fontRef idx="minor">
+            <a:schemeClr val="lt1"/>
+          </a:fontRef>
+        </p:style>
+        <p:txBody>
+          <a:bodyPr rtlCol="0" anchor="ctr"/>
+          <a:lstStyle/>
+          <a:p>
+            <a:pPr algn="ctr"/>
+            <a:r>
+              <a:rPr lang="en-US" dirty="0" err="1" smtClean="0"/>
+              <a:t>prev</a:t>
+            </a:r>
+            <a:endParaRPr lang="en-US" dirty="0"/>
+          </a:p>
+        </p:txBody>
+      </p:sp>
+      <p:sp>
+        <p:nvSpPr>
+          <p:cNvPr id="88" name="Oval 87"/>
+          <p:cNvSpPr/>
+          <p:nvPr/>
+        </p:nvSpPr>
+        <p:spPr>
+          <a:xfrm>
+            <a:off x="1493278" y="2476500"/>
+            <a:ext cx="1021772" cy="533400"/>
+          </a:xfrm>
+          <a:prstGeom prst="ellipse">
+            <a:avLst/>
+          </a:prstGeom>
+        </p:spPr>
+        <p:style>
+          <a:lnRef idx="2">
+            <a:schemeClr val="accent1">
+              <a:shade val="50000"/>
+            </a:schemeClr>
+          </a:lnRef>
+          <a:fillRef idx="1">
+            <a:schemeClr val="accent1"/>
+          </a:fillRef>
+          <a:effectRef idx="0">
+            <a:schemeClr val="accent1"/>
+          </a:effectRef>
+          <a:fontRef idx="minor">
+            <a:schemeClr val="lt1"/>
+          </a:fontRef>
+        </p:style>
+        <p:txBody>
+          <a:bodyPr rtlCol="0" anchor="ctr"/>
+          <a:lstStyle/>
+          <a:p>
+            <a:pPr algn="ctr"/>
+            <a:r>
+              <a:rPr lang="en-US" altLang="zh-CN" dirty="0" smtClean="0"/>
+              <a:t>new</a:t>
+            </a:r>
+            <a:endParaRPr lang="en-US" dirty="0"/>
+          </a:p>
+        </p:txBody>
+      </p:sp>
+      <p:sp>
+        <p:nvSpPr>
+          <p:cNvPr id="90" name="Oval 89"/>
+          <p:cNvSpPr/>
+          <p:nvPr/>
+        </p:nvSpPr>
+        <p:spPr>
+          <a:xfrm>
+            <a:off x="4515772" y="2388727"/>
+            <a:ext cx="970628" cy="571500"/>
+          </a:xfrm>
+          <a:prstGeom prst="ellipse">
+            <a:avLst/>
+          </a:prstGeom>
+        </p:spPr>
+        <p:style>
+          <a:lnRef idx="2">
+            <a:schemeClr val="accent1">
+              <a:shade val="50000"/>
+            </a:schemeClr>
+          </a:lnRef>
+          <a:fillRef idx="1">
+            <a:schemeClr val="accent1"/>
+          </a:fillRef>
+          <a:effectRef idx="0">
+            <a:schemeClr val="accent1"/>
+          </a:effectRef>
+          <a:fontRef idx="minor">
+            <a:schemeClr val="lt1"/>
+          </a:fontRef>
+        </p:style>
+        <p:txBody>
+          <a:bodyPr rtlCol="0" anchor="ctr"/>
+          <a:lstStyle/>
+          <a:p>
+            <a:pPr algn="ctr"/>
+            <a:r>
+              <a:rPr lang="en-US" altLang="zh-CN" dirty="0" smtClean="0"/>
+              <a:t>next</a:t>
+            </a:r>
+            <a:endParaRPr lang="en-US" dirty="0"/>
+          </a:p>
+        </p:txBody>
+      </p:sp>
+      <p:sp>
+        <p:nvSpPr>
+          <p:cNvPr id="53" name="Rectangle 52"/>
+          <p:cNvSpPr/>
+          <p:nvPr/>
+        </p:nvSpPr>
+        <p:spPr>
+          <a:xfrm>
+            <a:off x="838200" y="838200"/>
+            <a:ext cx="381000" cy="533400"/>
+          </a:xfrm>
+          <a:prstGeom prst="rect">
+            <a:avLst/>
+          </a:prstGeom>
+        </p:spPr>
+        <p:style>
+          <a:lnRef idx="2">
+            <a:schemeClr val="accent2">
+              <a:shade val="50000"/>
+            </a:schemeClr>
+          </a:lnRef>
+          <a:fillRef idx="1">
+            <a:schemeClr val="accent2"/>
+          </a:fillRef>
+          <a:effectRef idx="0">
+            <a:schemeClr val="accent2"/>
+          </a:effectRef>
+          <a:fontRef idx="minor">
+            <a:schemeClr val="lt1"/>
+          </a:fontRef>
+        </p:style>
+        <p:txBody>
+          <a:bodyPr rtlCol="0" anchor="ctr"/>
+          <a:lstStyle/>
+          <a:p>
+            <a:pPr algn="ctr"/>
+            <a:r>
+              <a:rPr lang="en-US" dirty="0" smtClean="0"/>
+              <a:t>p</a:t>
+            </a:r>
+            <a:endParaRPr lang="en-US" dirty="0"/>
+          </a:p>
+        </p:txBody>
+      </p:sp>
+      <p:grpSp>
+        <p:nvGrpSpPr>
+          <p:cNvPr id="54" name="Group 53"/>
+          <p:cNvGrpSpPr/>
+          <p:nvPr/>
+        </p:nvGrpSpPr>
+        <p:grpSpPr>
+          <a:xfrm>
+            <a:off x="2743200" y="1767555"/>
+            <a:ext cx="1219200" cy="533400"/>
+            <a:chOff x="914400" y="1524000"/>
+            <a:chExt cx="1219200" cy="533400"/>
+          </a:xfrm>
+        </p:grpSpPr>
+        <p:sp>
+          <p:nvSpPr>
+            <p:cNvPr id="55" name="Rectangle 54"/>
+            <p:cNvSpPr/>
+            <p:nvPr/>
+          </p:nvSpPr>
+          <p:spPr>
+            <a:xfrm>
+              <a:off x="914400" y="1524000"/>
+              <a:ext cx="1219200" cy="533400"/>
+            </a:xfrm>
+            <a:prstGeom prst="rect">
+              <a:avLst/>
+            </a:prstGeom>
+          </p:spPr>
+          <p:style>
+            <a:lnRef idx="2">
+              <a:schemeClr val="accent1">
+                <a:shade val="50000"/>
+              </a:schemeClr>
+            </a:lnRef>
+            <a:fillRef idx="1">
+              <a:schemeClr val="accent1"/>
+            </a:fillRef>
+            <a:effectRef idx="0">
+              <a:schemeClr val="accent1"/>
+            </a:effectRef>
+            <a:fontRef idx="minor">
+              <a:schemeClr val="lt1"/>
+            </a:fontRef>
+          </p:style>
+          <p:txBody>
+            <a:bodyPr rtlCol="0" anchor="ctr"/>
+            <a:lstStyle/>
+            <a:p>
+              <a:pPr algn="ctr"/>
+              <a:endParaRPr lang="en-US"/>
+            </a:p>
+          </p:txBody>
+        </p:sp>
+        <p:sp>
+          <p:nvSpPr>
+            <p:cNvPr id="56" name="Rectangle 55"/>
+            <p:cNvSpPr/>
+            <p:nvPr/>
+          </p:nvSpPr>
+          <p:spPr>
+            <a:xfrm>
+              <a:off x="1752600" y="1524000"/>
+              <a:ext cx="381000" cy="533400"/>
+            </a:xfrm>
+            <a:prstGeom prst="rect">
+              <a:avLst/>
+            </a:prstGeom>
+          </p:spPr>
+          <p:style>
+            <a:lnRef idx="2">
+              <a:schemeClr val="accent2">
+                <a:shade val="50000"/>
+              </a:schemeClr>
+            </a:lnRef>
+            <a:fillRef idx="1">
+              <a:schemeClr val="accent2"/>
+            </a:fillRef>
+            <a:effectRef idx="0">
+              <a:schemeClr val="accent2"/>
+            </a:effectRef>
+            <a:fontRef idx="minor">
+              <a:schemeClr val="lt1"/>
+            </a:fontRef>
+          </p:style>
+          <p:txBody>
+            <a:bodyPr rtlCol="0" anchor="ctr"/>
+            <a:lstStyle/>
+            <a:p>
+              <a:pPr algn="ctr"/>
+              <a:r>
+                <a:rPr lang="en-US" dirty="0" smtClean="0"/>
+                <a:t>n</a:t>
+              </a:r>
+              <a:endParaRPr lang="en-US" dirty="0"/>
+            </a:p>
+          </p:txBody>
+        </p:sp>
+      </p:grpSp>
+      <p:sp>
+        <p:nvSpPr>
+          <p:cNvPr id="57" name="Rectangle 56"/>
+          <p:cNvSpPr/>
+          <p:nvPr/>
+        </p:nvSpPr>
+        <p:spPr>
+          <a:xfrm>
+            <a:off x="2730156" y="1767555"/>
+            <a:ext cx="381000" cy="533400"/>
+          </a:xfrm>
+          <a:prstGeom prst="rect">
+            <a:avLst/>
+          </a:prstGeom>
+        </p:spPr>
+        <p:style>
+          <a:lnRef idx="2">
+            <a:schemeClr val="accent2">
+              <a:shade val="50000"/>
+            </a:schemeClr>
+          </a:lnRef>
+          <a:fillRef idx="1">
+            <a:schemeClr val="accent2"/>
+          </a:fillRef>
+          <a:effectRef idx="0">
+            <a:schemeClr val="accent2"/>
+          </a:effectRef>
+          <a:fontRef idx="minor">
+            <a:schemeClr val="lt1"/>
+          </a:fontRef>
+        </p:style>
+        <p:txBody>
+          <a:bodyPr rtlCol="0" anchor="ctr"/>
+          <a:lstStyle/>
+          <a:p>
+            <a:pPr algn="ctr"/>
+            <a:r>
+              <a:rPr lang="en-US" dirty="0" smtClean="0"/>
+              <a:t>p</a:t>
+            </a:r>
+            <a:endParaRPr lang="en-US" dirty="0"/>
+          </a:p>
+        </p:txBody>
+      </p:sp>
+      <p:grpSp>
+        <p:nvGrpSpPr>
+          <p:cNvPr id="58" name="Group 57"/>
+          <p:cNvGrpSpPr/>
+          <p:nvPr/>
+        </p:nvGrpSpPr>
+        <p:grpSpPr>
+          <a:xfrm>
+            <a:off x="4648200" y="838200"/>
+            <a:ext cx="1219200" cy="533400"/>
+            <a:chOff x="914400" y="1524000"/>
+            <a:chExt cx="1219200" cy="533400"/>
+          </a:xfrm>
+        </p:grpSpPr>
+        <p:sp>
+          <p:nvSpPr>
+            <p:cNvPr id="59" name="Rectangle 58"/>
+            <p:cNvSpPr/>
+            <p:nvPr/>
+          </p:nvSpPr>
+          <p:spPr>
+            <a:xfrm>
+              <a:off x="914400" y="1524000"/>
+              <a:ext cx="1219200" cy="533400"/>
+            </a:xfrm>
+            <a:prstGeom prst="rect">
+              <a:avLst/>
+            </a:prstGeom>
+          </p:spPr>
+          <p:style>
+            <a:lnRef idx="2">
+              <a:schemeClr val="accent1">
+                <a:shade val="50000"/>
+              </a:schemeClr>
+            </a:lnRef>
+            <a:fillRef idx="1">
+              <a:schemeClr val="accent1"/>
+            </a:fillRef>
+            <a:effectRef idx="0">
+              <a:schemeClr val="accent1"/>
+            </a:effectRef>
+            <a:fontRef idx="minor">
+              <a:schemeClr val="lt1"/>
+            </a:fontRef>
+          </p:style>
+          <p:txBody>
+            <a:bodyPr rtlCol="0" anchor="ctr"/>
+            <a:lstStyle/>
+            <a:p>
+              <a:pPr algn="ctr"/>
+              <a:endParaRPr lang="en-US"/>
+            </a:p>
+          </p:txBody>
+        </p:sp>
+        <p:sp>
+          <p:nvSpPr>
+            <p:cNvPr id="60" name="Rectangle 59"/>
+            <p:cNvSpPr/>
+            <p:nvPr/>
+          </p:nvSpPr>
+          <p:spPr>
+            <a:xfrm>
+              <a:off x="1752600" y="1524000"/>
+              <a:ext cx="381000" cy="533400"/>
+            </a:xfrm>
+            <a:prstGeom prst="rect">
+              <a:avLst/>
+            </a:prstGeom>
+          </p:spPr>
+          <p:style>
+            <a:lnRef idx="2">
+              <a:schemeClr val="accent2">
+                <a:shade val="50000"/>
+              </a:schemeClr>
+            </a:lnRef>
+            <a:fillRef idx="1">
+              <a:schemeClr val="accent2"/>
+            </a:fillRef>
+            <a:effectRef idx="0">
+              <a:schemeClr val="accent2"/>
+            </a:effectRef>
+            <a:fontRef idx="minor">
+              <a:schemeClr val="lt1"/>
+            </a:fontRef>
+          </p:style>
+          <p:txBody>
+            <a:bodyPr rtlCol="0" anchor="ctr"/>
+            <a:lstStyle/>
+            <a:p>
+              <a:pPr algn="ctr"/>
+              <a:r>
+                <a:rPr lang="en-US" dirty="0" smtClean="0"/>
+                <a:t>n</a:t>
+              </a:r>
+              <a:endParaRPr lang="en-US" dirty="0"/>
+            </a:p>
+          </p:txBody>
+        </p:sp>
+      </p:grpSp>
+      <p:sp>
+        <p:nvSpPr>
+          <p:cNvPr id="61" name="Rectangle 60"/>
+          <p:cNvSpPr/>
+          <p:nvPr/>
+        </p:nvSpPr>
+        <p:spPr>
+          <a:xfrm>
+            <a:off x="4635156" y="838200"/>
+            <a:ext cx="381000" cy="533400"/>
+          </a:xfrm>
+          <a:prstGeom prst="rect">
+            <a:avLst/>
+          </a:prstGeom>
+        </p:spPr>
+        <p:style>
+          <a:lnRef idx="2">
+            <a:schemeClr val="accent2">
+              <a:shade val="50000"/>
+            </a:schemeClr>
+          </a:lnRef>
+          <a:fillRef idx="1">
+            <a:schemeClr val="accent2"/>
+          </a:fillRef>
+          <a:effectRef idx="0">
+            <a:schemeClr val="accent2"/>
+          </a:effectRef>
+          <a:fontRef idx="minor">
+            <a:schemeClr val="lt1"/>
+          </a:fontRef>
+        </p:style>
+        <p:txBody>
+          <a:bodyPr rtlCol="0" anchor="ctr"/>
+          <a:lstStyle/>
+          <a:p>
+            <a:pPr algn="ctr"/>
+            <a:r>
+              <a:rPr lang="en-US" dirty="0" smtClean="0"/>
+              <a:t>p</a:t>
+            </a:r>
+            <a:endParaRPr lang="en-US" dirty="0"/>
+          </a:p>
+        </p:txBody>
+      </p:sp>
+      <p:cxnSp>
+        <p:nvCxnSpPr>
+          <p:cNvPr id="3" name="Straight Arrow Connector 2"/>
+          <p:cNvCxnSpPr>
+            <a:stCxn id="86" idx="0"/>
+          </p:cNvCxnSpPr>
+          <p:nvPr/>
+        </p:nvCxnSpPr>
+        <p:spPr>
+          <a:xfrm flipV="1">
+            <a:off x="828730" y="1371600"/>
+            <a:ext cx="22514" cy="685800"/>
+          </a:xfrm>
+          <a:prstGeom prst="straightConnector1">
+            <a:avLst/>
+          </a:prstGeom>
+          <a:ln>
+            <a:tailEnd type="arrow"/>
+          </a:ln>
+        </p:spPr>
+        <p:style>
+          <a:lnRef idx="1">
+            <a:schemeClr val="accent1"/>
+          </a:lnRef>
+          <a:fillRef idx="0">
+            <a:schemeClr val="accent1"/>
+          </a:fillRef>
+          <a:effectRef idx="0">
+            <a:schemeClr val="accent1"/>
+          </a:effectRef>
+          <a:fontRef idx="minor">
+            <a:schemeClr val="tx1"/>
+          </a:fontRef>
+        </p:style>
+      </p:cxnSp>
+      <p:cxnSp>
+        <p:nvCxnSpPr>
+          <p:cNvPr id="5" name="Straight Arrow Connector 4"/>
+          <p:cNvCxnSpPr>
+            <a:stCxn id="90" idx="0"/>
+          </p:cNvCxnSpPr>
+          <p:nvPr/>
+        </p:nvCxnSpPr>
+        <p:spPr>
+          <a:xfrm flipH="1" flipV="1">
+            <a:off x="4648200" y="1371600"/>
+            <a:ext cx="352886" cy="1017127"/>
+          </a:xfrm>
+          <a:prstGeom prst="straightConnector1">
+            <a:avLst/>
+          </a:prstGeom>
+          <a:ln>
+            <a:tailEnd type="arrow"/>
+          </a:ln>
+        </p:spPr>
+        <p:style>
+          <a:lnRef idx="1">
+            <a:schemeClr val="accent1"/>
+          </a:lnRef>
+          <a:fillRef idx="0">
+            <a:schemeClr val="accent1"/>
+          </a:fillRef>
+          <a:effectRef idx="0">
+            <a:schemeClr val="accent1"/>
+          </a:effectRef>
+          <a:fontRef idx="minor">
+            <a:schemeClr val="tx1"/>
+          </a:fontRef>
+        </p:style>
+      </p:cxnSp>
+      <p:cxnSp>
+        <p:nvCxnSpPr>
+          <p:cNvPr id="7" name="Straight Arrow Connector 6"/>
+          <p:cNvCxnSpPr>
+            <a:stCxn id="69" idx="3"/>
+            <a:endCxn id="61" idx="1"/>
+          </p:cNvCxnSpPr>
+          <p:nvPr/>
+        </p:nvCxnSpPr>
+        <p:spPr>
+          <a:xfrm>
+            <a:off x="2070444" y="1104900"/>
+            <a:ext cx="2564712" cy="0"/>
+          </a:xfrm>
+          <a:prstGeom prst="straightConnector1">
+            <a:avLst/>
+          </a:prstGeom>
+          <a:ln>
+            <a:tailEnd type="arrow"/>
+          </a:ln>
+        </p:spPr>
+        <p:style>
+          <a:lnRef idx="1">
+            <a:schemeClr val="accent1"/>
+          </a:lnRef>
+          <a:fillRef idx="0">
+            <a:schemeClr val="accent1"/>
+          </a:fillRef>
+          <a:effectRef idx="0">
+            <a:schemeClr val="accent1"/>
+          </a:effectRef>
+          <a:fontRef idx="minor">
+            <a:schemeClr val="tx1"/>
+          </a:fontRef>
+        </p:style>
+      </p:cxnSp>
+      <p:cxnSp>
+        <p:nvCxnSpPr>
+          <p:cNvPr id="9" name="Straight Arrow Connector 8"/>
+          <p:cNvCxnSpPr>
+            <a:stCxn id="88" idx="0"/>
+          </p:cNvCxnSpPr>
+          <p:nvPr/>
+        </p:nvCxnSpPr>
+        <p:spPr>
+          <a:xfrm flipV="1">
+            <a:off x="2004164" y="2300955"/>
+            <a:ext cx="725992" cy="175545"/>
+          </a:xfrm>
+          <a:prstGeom prst="straightConnector1">
+            <a:avLst/>
+          </a:prstGeom>
+          <a:ln>
+            <a:tailEnd type="arrow"/>
+          </a:ln>
+        </p:spPr>
+        <p:style>
+          <a:lnRef idx="1">
+            <a:schemeClr val="accent1"/>
+          </a:lnRef>
+          <a:fillRef idx="0">
+            <a:schemeClr val="accent1"/>
+          </a:fillRef>
+          <a:effectRef idx="0">
+            <a:schemeClr val="accent1"/>
+          </a:effectRef>
+          <a:fontRef idx="minor">
+            <a:schemeClr val="tx1"/>
+          </a:fontRef>
+        </p:style>
+      </p:cxnSp>
+      <p:grpSp>
+        <p:nvGrpSpPr>
+          <p:cNvPr id="83" name="Group 82"/>
+          <p:cNvGrpSpPr/>
+          <p:nvPr/>
+        </p:nvGrpSpPr>
+        <p:grpSpPr>
+          <a:xfrm>
+            <a:off x="855292" y="4000500"/>
+            <a:ext cx="1219200" cy="533400"/>
+            <a:chOff x="914400" y="1524000"/>
+            <a:chExt cx="1219200" cy="533400"/>
+          </a:xfrm>
+        </p:grpSpPr>
+        <p:sp>
+          <p:nvSpPr>
+            <p:cNvPr id="84" name="Rectangle 83"/>
+            <p:cNvSpPr/>
+            <p:nvPr/>
+          </p:nvSpPr>
+          <p:spPr>
+            <a:xfrm>
+              <a:off x="914400" y="1524000"/>
+              <a:ext cx="1219200" cy="533400"/>
+            </a:xfrm>
+            <a:prstGeom prst="rect">
+              <a:avLst/>
+            </a:prstGeom>
+          </p:spPr>
+          <p:style>
+            <a:lnRef idx="2">
+              <a:schemeClr val="accent1">
+                <a:shade val="50000"/>
+              </a:schemeClr>
+            </a:lnRef>
+            <a:fillRef idx="1">
+              <a:schemeClr val="accent1"/>
+            </a:fillRef>
+            <a:effectRef idx="0">
+              <a:schemeClr val="accent1"/>
+            </a:effectRef>
+            <a:fontRef idx="minor">
+              <a:schemeClr val="lt1"/>
+            </a:fontRef>
+          </p:style>
+          <p:txBody>
+            <a:bodyPr rtlCol="0" anchor="ctr"/>
+            <a:lstStyle/>
+            <a:p>
+              <a:pPr algn="ctr"/>
+              <a:endParaRPr lang="en-US"/>
+            </a:p>
+          </p:txBody>
+        </p:sp>
+        <p:sp>
+          <p:nvSpPr>
+            <p:cNvPr id="95" name="Rectangle 94"/>
+            <p:cNvSpPr/>
+            <p:nvPr/>
+          </p:nvSpPr>
+          <p:spPr>
+            <a:xfrm>
+              <a:off x="1752600" y="1524000"/>
+              <a:ext cx="381000" cy="533400"/>
+            </a:xfrm>
+            <a:prstGeom prst="rect">
+              <a:avLst/>
+            </a:prstGeom>
+          </p:spPr>
+          <p:style>
+            <a:lnRef idx="2">
+              <a:schemeClr val="accent2">
+                <a:shade val="50000"/>
+              </a:schemeClr>
+            </a:lnRef>
+            <a:fillRef idx="1">
+              <a:schemeClr val="accent2"/>
+            </a:fillRef>
+            <a:effectRef idx="0">
+              <a:schemeClr val="accent2"/>
+            </a:effectRef>
+            <a:fontRef idx="minor">
+              <a:schemeClr val="lt1"/>
+            </a:fontRef>
+          </p:style>
+          <p:txBody>
+            <a:bodyPr rtlCol="0" anchor="ctr"/>
+            <a:lstStyle/>
+            <a:p>
+              <a:pPr algn="ctr"/>
+              <a:r>
+                <a:rPr lang="en-US" dirty="0" smtClean="0"/>
+                <a:t>n</a:t>
+              </a:r>
+              <a:endParaRPr lang="en-US" dirty="0"/>
+            </a:p>
+          </p:txBody>
+        </p:sp>
+      </p:grpSp>
+      <p:sp>
+        <p:nvSpPr>
+          <p:cNvPr id="96" name="Oval 95"/>
+          <p:cNvSpPr/>
+          <p:nvPr/>
+        </p:nvSpPr>
+        <p:spPr>
+          <a:xfrm>
+            <a:off x="7256092" y="4000500"/>
+            <a:ext cx="685800" cy="533400"/>
+          </a:xfrm>
+          <a:prstGeom prst="ellipse">
+            <a:avLst/>
+          </a:prstGeom>
+        </p:spPr>
+        <p:style>
+          <a:lnRef idx="1">
+            <a:schemeClr val="accent2"/>
+          </a:lnRef>
+          <a:fillRef idx="2">
+            <a:schemeClr val="accent2"/>
+          </a:fillRef>
+          <a:effectRef idx="1">
+            <a:schemeClr val="accent2"/>
+          </a:effectRef>
+          <a:fontRef idx="minor">
+            <a:schemeClr val="dk1"/>
+          </a:fontRef>
+        </p:style>
+        <p:txBody>
+          <a:bodyPr rtlCol="0" anchor="ctr"/>
+          <a:lstStyle/>
+          <a:p>
+            <a:pPr algn="ctr"/>
+            <a:r>
+              <a:rPr lang="en-US" altLang="zh-CN" sz="1100" dirty="0" smtClean="0"/>
+              <a:t>NULL</a:t>
+            </a:r>
+            <a:endParaRPr lang="en-US" sz="1100" dirty="0"/>
+          </a:p>
+        </p:txBody>
+      </p:sp>
+      <p:sp>
+        <p:nvSpPr>
+          <p:cNvPr id="102" name="Oval 101"/>
+          <p:cNvSpPr/>
+          <p:nvPr/>
+        </p:nvSpPr>
+        <p:spPr>
+          <a:xfrm>
+            <a:off x="321892" y="5219700"/>
+            <a:ext cx="1021772" cy="533400"/>
+          </a:xfrm>
+          <a:prstGeom prst="ellipse">
+            <a:avLst/>
+          </a:prstGeom>
+        </p:spPr>
+        <p:style>
+          <a:lnRef idx="2">
+            <a:schemeClr val="accent1">
+              <a:shade val="50000"/>
+            </a:schemeClr>
+          </a:lnRef>
+          <a:fillRef idx="1">
+            <a:schemeClr val="accent1"/>
+          </a:fillRef>
+          <a:effectRef idx="0">
+            <a:schemeClr val="accent1"/>
+          </a:effectRef>
+          <a:fontRef idx="minor">
+            <a:schemeClr val="lt1"/>
+          </a:fontRef>
+        </p:style>
+        <p:txBody>
+          <a:bodyPr rtlCol="0" anchor="ctr"/>
+          <a:lstStyle/>
+          <a:p>
+            <a:pPr algn="ctr"/>
+            <a:r>
+              <a:rPr lang="en-US" dirty="0" err="1" smtClean="0"/>
+              <a:t>prev</a:t>
+            </a:r>
+            <a:endParaRPr lang="en-US" dirty="0"/>
+          </a:p>
+        </p:txBody>
+      </p:sp>
+      <p:sp>
+        <p:nvSpPr>
+          <p:cNvPr id="104" name="Oval 103"/>
+          <p:cNvSpPr/>
+          <p:nvPr/>
+        </p:nvSpPr>
+        <p:spPr>
+          <a:xfrm>
+            <a:off x="1497326" y="5638800"/>
+            <a:ext cx="1021772" cy="533400"/>
+          </a:xfrm>
+          <a:prstGeom prst="ellipse">
+            <a:avLst/>
+          </a:prstGeom>
+        </p:spPr>
+        <p:style>
+          <a:lnRef idx="2">
+            <a:schemeClr val="accent1">
+              <a:shade val="50000"/>
+            </a:schemeClr>
+          </a:lnRef>
+          <a:fillRef idx="1">
+            <a:schemeClr val="accent1"/>
+          </a:fillRef>
+          <a:effectRef idx="0">
+            <a:schemeClr val="accent1"/>
+          </a:effectRef>
+          <a:fontRef idx="minor">
+            <a:schemeClr val="lt1"/>
+          </a:fontRef>
+        </p:style>
+        <p:txBody>
+          <a:bodyPr rtlCol="0" anchor="ctr"/>
+          <a:lstStyle/>
+          <a:p>
+            <a:pPr algn="ctr"/>
+            <a:r>
+              <a:rPr lang="en-US" altLang="zh-CN" dirty="0" smtClean="0"/>
+              <a:t>new</a:t>
+            </a:r>
+            <a:endParaRPr lang="en-US" dirty="0"/>
+          </a:p>
+        </p:txBody>
+      </p:sp>
+      <p:sp>
+        <p:nvSpPr>
+          <p:cNvPr id="112" name="Oval 111"/>
+          <p:cNvSpPr/>
+          <p:nvPr/>
+        </p:nvSpPr>
+        <p:spPr>
+          <a:xfrm>
+            <a:off x="4519820" y="5551027"/>
+            <a:ext cx="970628" cy="571500"/>
+          </a:xfrm>
+          <a:prstGeom prst="ellipse">
+            <a:avLst/>
+          </a:prstGeom>
+        </p:spPr>
+        <p:style>
+          <a:lnRef idx="2">
+            <a:schemeClr val="accent1">
+              <a:shade val="50000"/>
+            </a:schemeClr>
+          </a:lnRef>
+          <a:fillRef idx="1">
+            <a:schemeClr val="accent1"/>
+          </a:fillRef>
+          <a:effectRef idx="0">
+            <a:schemeClr val="accent1"/>
+          </a:effectRef>
+          <a:fontRef idx="minor">
+            <a:schemeClr val="lt1"/>
+          </a:fontRef>
+        </p:style>
+        <p:txBody>
+          <a:bodyPr rtlCol="0" anchor="ctr"/>
+          <a:lstStyle/>
+          <a:p>
+            <a:pPr algn="ctr"/>
+            <a:r>
+              <a:rPr lang="en-US" altLang="zh-CN" dirty="0" smtClean="0"/>
+              <a:t>next</a:t>
+            </a:r>
+            <a:endParaRPr lang="en-US" dirty="0"/>
+          </a:p>
+        </p:txBody>
+      </p:sp>
+      <p:sp>
+        <p:nvSpPr>
+          <p:cNvPr id="113" name="Rectangle 112"/>
+          <p:cNvSpPr/>
+          <p:nvPr/>
+        </p:nvSpPr>
+        <p:spPr>
+          <a:xfrm>
+            <a:off x="842248" y="4000500"/>
+            <a:ext cx="381000" cy="533400"/>
+          </a:xfrm>
+          <a:prstGeom prst="rect">
+            <a:avLst/>
+          </a:prstGeom>
+        </p:spPr>
+        <p:style>
+          <a:lnRef idx="2">
+            <a:schemeClr val="accent2">
+              <a:shade val="50000"/>
+            </a:schemeClr>
+          </a:lnRef>
+          <a:fillRef idx="1">
+            <a:schemeClr val="accent2"/>
+          </a:fillRef>
+          <a:effectRef idx="0">
+            <a:schemeClr val="accent2"/>
+          </a:effectRef>
+          <a:fontRef idx="minor">
+            <a:schemeClr val="lt1"/>
+          </a:fontRef>
+        </p:style>
+        <p:txBody>
+          <a:bodyPr rtlCol="0" anchor="ctr"/>
+          <a:lstStyle/>
+          <a:p>
+            <a:pPr algn="ctr"/>
+            <a:r>
+              <a:rPr lang="en-US" dirty="0" smtClean="0"/>
+              <a:t>p</a:t>
+            </a:r>
+            <a:endParaRPr lang="en-US" dirty="0"/>
+          </a:p>
+        </p:txBody>
+      </p:sp>
+      <p:grpSp>
+        <p:nvGrpSpPr>
+          <p:cNvPr id="114" name="Group 113"/>
+          <p:cNvGrpSpPr/>
+          <p:nvPr/>
+        </p:nvGrpSpPr>
+        <p:grpSpPr>
+          <a:xfrm>
+            <a:off x="2747248" y="4929855"/>
+            <a:ext cx="1219200" cy="533400"/>
+            <a:chOff x="914400" y="1524000"/>
+            <a:chExt cx="1219200" cy="533400"/>
+          </a:xfrm>
+        </p:grpSpPr>
+        <p:sp>
+          <p:nvSpPr>
+            <p:cNvPr id="115" name="Rectangle 114"/>
+            <p:cNvSpPr/>
+            <p:nvPr/>
+          </p:nvSpPr>
+          <p:spPr>
+            <a:xfrm>
+              <a:off x="914400" y="1524000"/>
+              <a:ext cx="1219200" cy="533400"/>
+            </a:xfrm>
+            <a:prstGeom prst="rect">
+              <a:avLst/>
+            </a:prstGeom>
+          </p:spPr>
+          <p:style>
+            <a:lnRef idx="2">
+              <a:schemeClr val="accent1">
+                <a:shade val="50000"/>
+              </a:schemeClr>
+            </a:lnRef>
+            <a:fillRef idx="1">
+              <a:schemeClr val="accent1"/>
+            </a:fillRef>
+            <a:effectRef idx="0">
+              <a:schemeClr val="accent1"/>
+            </a:effectRef>
+            <a:fontRef idx="minor">
+              <a:schemeClr val="lt1"/>
+            </a:fontRef>
+          </p:style>
+          <p:txBody>
+            <a:bodyPr rtlCol="0" anchor="ctr"/>
+            <a:lstStyle/>
+            <a:p>
+              <a:pPr algn="ctr"/>
+              <a:endParaRPr lang="en-US"/>
+            </a:p>
+          </p:txBody>
+        </p:sp>
+        <p:sp>
+          <p:nvSpPr>
+            <p:cNvPr id="116" name="Rectangle 115"/>
+            <p:cNvSpPr/>
+            <p:nvPr/>
+          </p:nvSpPr>
+          <p:spPr>
+            <a:xfrm>
+              <a:off x="1752600" y="1524000"/>
+              <a:ext cx="381000" cy="533400"/>
+            </a:xfrm>
+            <a:prstGeom prst="rect">
+              <a:avLst/>
+            </a:prstGeom>
+          </p:spPr>
+          <p:style>
+            <a:lnRef idx="2">
+              <a:schemeClr val="accent2">
+                <a:shade val="50000"/>
+              </a:schemeClr>
+            </a:lnRef>
+            <a:fillRef idx="1">
+              <a:schemeClr val="accent2"/>
+            </a:fillRef>
+            <a:effectRef idx="0">
+              <a:schemeClr val="accent2"/>
+            </a:effectRef>
+            <a:fontRef idx="minor">
+              <a:schemeClr val="lt1"/>
+            </a:fontRef>
+          </p:style>
+          <p:txBody>
+            <a:bodyPr rtlCol="0" anchor="ctr"/>
+            <a:lstStyle/>
+            <a:p>
+              <a:pPr algn="ctr"/>
+              <a:r>
+                <a:rPr lang="en-US" dirty="0" smtClean="0"/>
+                <a:t>n</a:t>
+              </a:r>
+              <a:endParaRPr lang="en-US" dirty="0"/>
+            </a:p>
+          </p:txBody>
+        </p:sp>
+      </p:grpSp>
+      <p:sp>
+        <p:nvSpPr>
+          <p:cNvPr id="127" name="Rectangle 126"/>
+          <p:cNvSpPr/>
+          <p:nvPr/>
+        </p:nvSpPr>
+        <p:spPr>
+          <a:xfrm>
+            <a:off x="2734204" y="4929855"/>
+            <a:ext cx="381000" cy="533400"/>
+          </a:xfrm>
+          <a:prstGeom prst="rect">
+            <a:avLst/>
+          </a:prstGeom>
+        </p:spPr>
+        <p:style>
+          <a:lnRef idx="2">
+            <a:schemeClr val="accent2">
+              <a:shade val="50000"/>
+            </a:schemeClr>
+          </a:lnRef>
+          <a:fillRef idx="1">
+            <a:schemeClr val="accent2"/>
+          </a:fillRef>
+          <a:effectRef idx="0">
+            <a:schemeClr val="accent2"/>
+          </a:effectRef>
+          <a:fontRef idx="minor">
+            <a:schemeClr val="lt1"/>
+          </a:fontRef>
+        </p:style>
+        <p:txBody>
+          <a:bodyPr rtlCol="0" anchor="ctr"/>
+          <a:lstStyle/>
+          <a:p>
+            <a:pPr algn="ctr"/>
+            <a:r>
+              <a:rPr lang="en-US" dirty="0" smtClean="0"/>
+              <a:t>p</a:t>
+            </a:r>
+            <a:endParaRPr lang="en-US" dirty="0"/>
+          </a:p>
+        </p:txBody>
+      </p:sp>
+      <p:grpSp>
+        <p:nvGrpSpPr>
+          <p:cNvPr id="128" name="Group 127"/>
+          <p:cNvGrpSpPr/>
+          <p:nvPr/>
+        </p:nvGrpSpPr>
+        <p:grpSpPr>
+          <a:xfrm>
+            <a:off x="4652248" y="4000500"/>
+            <a:ext cx="1219200" cy="533400"/>
+            <a:chOff x="914400" y="1524000"/>
+            <a:chExt cx="1219200" cy="533400"/>
+          </a:xfrm>
+        </p:grpSpPr>
+        <p:sp>
+          <p:nvSpPr>
+            <p:cNvPr id="129" name="Rectangle 128"/>
+            <p:cNvSpPr/>
+            <p:nvPr/>
+          </p:nvSpPr>
+          <p:spPr>
+            <a:xfrm>
+              <a:off x="914400" y="1524000"/>
+              <a:ext cx="1219200" cy="533400"/>
+            </a:xfrm>
+            <a:prstGeom prst="rect">
+              <a:avLst/>
+            </a:prstGeom>
+          </p:spPr>
+          <p:style>
+            <a:lnRef idx="2">
+              <a:schemeClr val="accent1">
+                <a:shade val="50000"/>
+              </a:schemeClr>
+            </a:lnRef>
+            <a:fillRef idx="1">
+              <a:schemeClr val="accent1"/>
+            </a:fillRef>
+            <a:effectRef idx="0">
+              <a:schemeClr val="accent1"/>
+            </a:effectRef>
+            <a:fontRef idx="minor">
+              <a:schemeClr val="lt1"/>
+            </a:fontRef>
+          </p:style>
+          <p:txBody>
+            <a:bodyPr rtlCol="0" anchor="ctr"/>
+            <a:lstStyle/>
+            <a:p>
+              <a:pPr algn="ctr"/>
+              <a:endParaRPr lang="en-US"/>
+            </a:p>
+          </p:txBody>
+        </p:sp>
+        <p:sp>
+          <p:nvSpPr>
+            <p:cNvPr id="130" name="Rectangle 129"/>
+            <p:cNvSpPr/>
+            <p:nvPr/>
+          </p:nvSpPr>
+          <p:spPr>
+            <a:xfrm>
+              <a:off x="1752600" y="1524000"/>
+              <a:ext cx="381000" cy="533400"/>
+            </a:xfrm>
+            <a:prstGeom prst="rect">
+              <a:avLst/>
+            </a:prstGeom>
+          </p:spPr>
+          <p:style>
+            <a:lnRef idx="2">
+              <a:schemeClr val="accent2">
+                <a:shade val="50000"/>
+              </a:schemeClr>
+            </a:lnRef>
+            <a:fillRef idx="1">
+              <a:schemeClr val="accent2"/>
+            </a:fillRef>
+            <a:effectRef idx="0">
+              <a:schemeClr val="accent2"/>
+            </a:effectRef>
+            <a:fontRef idx="minor">
+              <a:schemeClr val="lt1"/>
+            </a:fontRef>
+          </p:style>
+          <p:txBody>
+            <a:bodyPr rtlCol="0" anchor="ctr"/>
+            <a:lstStyle/>
+            <a:p>
+              <a:pPr algn="ctr"/>
+              <a:r>
+                <a:rPr lang="en-US" dirty="0" smtClean="0"/>
+                <a:t>n</a:t>
+              </a:r>
+              <a:endParaRPr lang="en-US" dirty="0"/>
+            </a:p>
+          </p:txBody>
+        </p:sp>
+      </p:grpSp>
+      <p:sp>
+        <p:nvSpPr>
+          <p:cNvPr id="131" name="Rectangle 130"/>
+          <p:cNvSpPr/>
+          <p:nvPr/>
+        </p:nvSpPr>
+        <p:spPr>
+          <a:xfrm>
+            <a:off x="4639204" y="4000500"/>
+            <a:ext cx="381000" cy="533400"/>
+          </a:xfrm>
+          <a:prstGeom prst="rect">
+            <a:avLst/>
+          </a:prstGeom>
+        </p:spPr>
+        <p:style>
+          <a:lnRef idx="2">
+            <a:schemeClr val="accent2">
+              <a:shade val="50000"/>
+            </a:schemeClr>
+          </a:lnRef>
+          <a:fillRef idx="1">
+            <a:schemeClr val="accent2"/>
+          </a:fillRef>
+          <a:effectRef idx="0">
+            <a:schemeClr val="accent2"/>
+          </a:effectRef>
+          <a:fontRef idx="minor">
+            <a:schemeClr val="lt1"/>
+          </a:fontRef>
+        </p:style>
+        <p:txBody>
+          <a:bodyPr rtlCol="0" anchor="ctr"/>
+          <a:lstStyle/>
+          <a:p>
+            <a:pPr algn="ctr"/>
+            <a:r>
+              <a:rPr lang="en-US" dirty="0" smtClean="0"/>
+              <a:t>p</a:t>
+            </a:r>
+            <a:endParaRPr lang="en-US" dirty="0"/>
+          </a:p>
+        </p:txBody>
+      </p:sp>
+      <p:cxnSp>
+        <p:nvCxnSpPr>
+          <p:cNvPr id="132" name="Straight Arrow Connector 131"/>
+          <p:cNvCxnSpPr>
+            <a:stCxn id="102" idx="0"/>
+          </p:cNvCxnSpPr>
+          <p:nvPr/>
+        </p:nvCxnSpPr>
+        <p:spPr>
+          <a:xfrm flipV="1">
+            <a:off x="832778" y="4533900"/>
+            <a:ext cx="22514" cy="685800"/>
+          </a:xfrm>
+          <a:prstGeom prst="straightConnector1">
+            <a:avLst/>
+          </a:prstGeom>
+          <a:ln>
+            <a:tailEnd type="arrow"/>
+          </a:ln>
+        </p:spPr>
+        <p:style>
+          <a:lnRef idx="1">
+            <a:schemeClr val="accent1"/>
+          </a:lnRef>
+          <a:fillRef idx="0">
+            <a:schemeClr val="accent1"/>
+          </a:fillRef>
+          <a:effectRef idx="0">
+            <a:schemeClr val="accent1"/>
+          </a:effectRef>
+          <a:fontRef idx="minor">
+            <a:schemeClr val="tx1"/>
+          </a:fontRef>
+        </p:style>
+      </p:cxnSp>
+      <p:cxnSp>
+        <p:nvCxnSpPr>
+          <p:cNvPr id="133" name="Straight Arrow Connector 132"/>
+          <p:cNvCxnSpPr>
+            <a:stCxn id="112" idx="0"/>
+          </p:cNvCxnSpPr>
+          <p:nvPr/>
+        </p:nvCxnSpPr>
+        <p:spPr>
+          <a:xfrm flipH="1" flipV="1">
+            <a:off x="4652248" y="4533900"/>
+            <a:ext cx="352886" cy="1017127"/>
+          </a:xfrm>
+          <a:prstGeom prst="straightConnector1">
+            <a:avLst/>
+          </a:prstGeom>
+          <a:ln>
+            <a:tailEnd type="arrow"/>
+          </a:ln>
+        </p:spPr>
+        <p:style>
+          <a:lnRef idx="1">
+            <a:schemeClr val="accent1"/>
+          </a:lnRef>
+          <a:fillRef idx="0">
+            <a:schemeClr val="accent1"/>
+          </a:fillRef>
+          <a:effectRef idx="0">
+            <a:schemeClr val="accent1"/>
+          </a:effectRef>
+          <a:fontRef idx="minor">
+            <a:schemeClr val="tx1"/>
+          </a:fontRef>
+        </p:style>
+      </p:cxnSp>
+      <p:cxnSp>
+        <p:nvCxnSpPr>
+          <p:cNvPr id="135" name="Straight Arrow Connector 134"/>
+          <p:cNvCxnSpPr>
+            <a:stCxn id="104" idx="0"/>
+          </p:cNvCxnSpPr>
+          <p:nvPr/>
+        </p:nvCxnSpPr>
+        <p:spPr>
+          <a:xfrm flipV="1">
+            <a:off x="2008212" y="5463255"/>
+            <a:ext cx="725992" cy="175545"/>
+          </a:xfrm>
+          <a:prstGeom prst="straightConnector1">
+            <a:avLst/>
+          </a:prstGeom>
+          <a:ln>
+            <a:tailEnd type="arrow"/>
+          </a:ln>
+        </p:spPr>
+        <p:style>
+          <a:lnRef idx="1">
+            <a:schemeClr val="accent1"/>
+          </a:lnRef>
+          <a:fillRef idx="0">
+            <a:schemeClr val="accent1"/>
+          </a:fillRef>
+          <a:effectRef idx="0">
+            <a:schemeClr val="accent1"/>
+          </a:effectRef>
+          <a:fontRef idx="minor">
+            <a:schemeClr val="tx1"/>
+          </a:fontRef>
+        </p:style>
+      </p:cxnSp>
+      <p:cxnSp>
+        <p:nvCxnSpPr>
+          <p:cNvPr id="16" name="Straight Arrow Connector 15"/>
+          <p:cNvCxnSpPr>
+            <a:stCxn id="129" idx="1"/>
+          </p:cNvCxnSpPr>
+          <p:nvPr/>
+        </p:nvCxnSpPr>
+        <p:spPr>
+          <a:xfrm flipH="1">
+            <a:off x="2730156" y="4267200"/>
+            <a:ext cx="1922092" cy="662655"/>
+          </a:xfrm>
+          <a:prstGeom prst="straightConnector1">
+            <a:avLst/>
+          </a:prstGeom>
+          <a:ln>
+            <a:tailEnd type="arrow"/>
+          </a:ln>
+        </p:spPr>
+        <p:style>
+          <a:lnRef idx="1">
+            <a:schemeClr val="accent1"/>
+          </a:lnRef>
+          <a:fillRef idx="0">
+            <a:schemeClr val="accent1"/>
+          </a:fillRef>
+          <a:effectRef idx="0">
+            <a:schemeClr val="accent1"/>
+          </a:effectRef>
+          <a:fontRef idx="minor">
+            <a:schemeClr val="tx1"/>
+          </a:fontRef>
+        </p:style>
+      </p:cxnSp>
+      <p:sp>
+        <p:nvSpPr>
+          <p:cNvPr id="17" name="Oval 16"/>
+          <p:cNvSpPr/>
+          <p:nvPr/>
+        </p:nvSpPr>
+        <p:spPr>
+          <a:xfrm>
+            <a:off x="3352800" y="4340638"/>
+            <a:ext cx="245692" cy="278273"/>
+          </a:xfrm>
+          <a:prstGeom prst="ellipse">
+            <a:avLst/>
+          </a:prstGeom>
+        </p:spPr>
+        <p:style>
+          <a:lnRef idx="2">
+            <a:schemeClr val="accent1">
+              <a:shade val="50000"/>
+            </a:schemeClr>
+          </a:lnRef>
+          <a:fillRef idx="1">
+            <a:schemeClr val="accent1"/>
+          </a:fillRef>
+          <a:effectRef idx="0">
+            <a:schemeClr val="accent1"/>
+          </a:effectRef>
+          <a:fontRef idx="minor">
+            <a:schemeClr val="lt1"/>
+          </a:fontRef>
+        </p:style>
+        <p:txBody>
+          <a:bodyPr rtlCol="0" anchor="ctr"/>
+          <a:lstStyle/>
+          <a:p>
+            <a:pPr algn="ctr"/>
+            <a:r>
+              <a:rPr lang="en-US" dirty="0"/>
+              <a:t>4</a:t>
+            </a:r>
+            <a:endParaRPr lang="en-US" dirty="0"/>
+          </a:p>
+        </p:txBody>
+      </p:sp>
+      <p:cxnSp>
+        <p:nvCxnSpPr>
+          <p:cNvPr id="19" name="Straight Arrow Connector 18"/>
+          <p:cNvCxnSpPr>
+            <a:stCxn id="115" idx="3"/>
+          </p:cNvCxnSpPr>
+          <p:nvPr/>
+        </p:nvCxnSpPr>
+        <p:spPr>
+          <a:xfrm flipV="1">
+            <a:off x="3966448" y="4533900"/>
+            <a:ext cx="668708" cy="662655"/>
+          </a:xfrm>
+          <a:prstGeom prst="straightConnector1">
+            <a:avLst/>
+          </a:prstGeom>
+          <a:ln>
+            <a:tailEnd type="arrow"/>
+          </a:ln>
+        </p:spPr>
+        <p:style>
+          <a:lnRef idx="1">
+            <a:schemeClr val="accent1"/>
+          </a:lnRef>
+          <a:fillRef idx="0">
+            <a:schemeClr val="accent1"/>
+          </a:fillRef>
+          <a:effectRef idx="0">
+            <a:schemeClr val="accent1"/>
+          </a:effectRef>
+          <a:fontRef idx="minor">
+            <a:schemeClr val="tx1"/>
+          </a:fontRef>
+        </p:style>
+      </p:cxnSp>
+      <p:sp>
+        <p:nvSpPr>
+          <p:cNvPr id="136" name="Oval 135"/>
+          <p:cNvSpPr/>
+          <p:nvPr/>
+        </p:nvSpPr>
+        <p:spPr>
+          <a:xfrm>
+            <a:off x="4177956" y="4538082"/>
+            <a:ext cx="245692" cy="278273"/>
+          </a:xfrm>
+          <a:prstGeom prst="ellipse">
+            <a:avLst/>
+          </a:prstGeom>
+        </p:spPr>
+        <p:style>
+          <a:lnRef idx="2">
+            <a:schemeClr val="accent1">
+              <a:shade val="50000"/>
+            </a:schemeClr>
+          </a:lnRef>
+          <a:fillRef idx="1">
+            <a:schemeClr val="accent1"/>
+          </a:fillRef>
+          <a:effectRef idx="0">
+            <a:schemeClr val="accent1"/>
+          </a:effectRef>
+          <a:fontRef idx="minor">
+            <a:schemeClr val="lt1"/>
+          </a:fontRef>
+        </p:style>
+        <p:txBody>
+          <a:bodyPr rtlCol="0" anchor="ctr"/>
+          <a:lstStyle/>
+          <a:p>
+            <a:pPr algn="ctr"/>
+            <a:r>
+              <a:rPr lang="en-US" dirty="0"/>
+              <a:t>3</a:t>
+            </a:r>
+            <a:endParaRPr lang="en-US" dirty="0"/>
+          </a:p>
+        </p:txBody>
+      </p:sp>
+      <p:cxnSp>
+        <p:nvCxnSpPr>
+          <p:cNvPr id="21" name="Straight Arrow Connector 20"/>
+          <p:cNvCxnSpPr>
+            <a:stCxn id="127" idx="1"/>
+          </p:cNvCxnSpPr>
+          <p:nvPr/>
+        </p:nvCxnSpPr>
+        <p:spPr>
+          <a:xfrm flipH="1" flipV="1">
+            <a:off x="828730" y="4538082"/>
+            <a:ext cx="1905474" cy="658473"/>
+          </a:xfrm>
+          <a:prstGeom prst="straightConnector1">
+            <a:avLst/>
+          </a:prstGeom>
+          <a:ln>
+            <a:tailEnd type="arrow"/>
+          </a:ln>
+        </p:spPr>
+        <p:style>
+          <a:lnRef idx="1">
+            <a:schemeClr val="accent1"/>
+          </a:lnRef>
+          <a:fillRef idx="0">
+            <a:schemeClr val="accent1"/>
+          </a:fillRef>
+          <a:effectRef idx="0">
+            <a:schemeClr val="accent1"/>
+          </a:effectRef>
+          <a:fontRef idx="minor">
+            <a:schemeClr val="tx1"/>
+          </a:fontRef>
+        </p:style>
+      </p:cxnSp>
+      <p:sp>
+        <p:nvSpPr>
+          <p:cNvPr id="137" name="Oval 136"/>
+          <p:cNvSpPr/>
+          <p:nvPr/>
+        </p:nvSpPr>
+        <p:spPr>
+          <a:xfrm>
+            <a:off x="2004164" y="4686653"/>
+            <a:ext cx="245692" cy="278273"/>
+          </a:xfrm>
+          <a:prstGeom prst="ellipse">
+            <a:avLst/>
+          </a:prstGeom>
+        </p:spPr>
+        <p:style>
+          <a:lnRef idx="2">
+            <a:schemeClr val="accent1">
+              <a:shade val="50000"/>
+            </a:schemeClr>
+          </a:lnRef>
+          <a:fillRef idx="1">
+            <a:schemeClr val="accent1"/>
+          </a:fillRef>
+          <a:effectRef idx="0">
+            <a:schemeClr val="accent1"/>
+          </a:effectRef>
+          <a:fontRef idx="minor">
+            <a:schemeClr val="lt1"/>
+          </a:fontRef>
+        </p:style>
+        <p:txBody>
+          <a:bodyPr rtlCol="0" anchor="ctr"/>
+          <a:lstStyle/>
+          <a:p>
+            <a:pPr algn="ctr"/>
+            <a:r>
+              <a:rPr lang="en-US" dirty="0" smtClean="0"/>
+              <a:t>2</a:t>
+            </a:r>
+            <a:endParaRPr lang="en-US" dirty="0"/>
+          </a:p>
+        </p:txBody>
+      </p:sp>
+      <p:cxnSp>
+        <p:nvCxnSpPr>
+          <p:cNvPr id="23" name="Straight Arrow Connector 22"/>
+          <p:cNvCxnSpPr>
+            <a:stCxn id="95" idx="3"/>
+          </p:cNvCxnSpPr>
+          <p:nvPr/>
+        </p:nvCxnSpPr>
+        <p:spPr>
+          <a:xfrm>
+            <a:off x="2074492" y="4267200"/>
+            <a:ext cx="655664" cy="697726"/>
+          </a:xfrm>
+          <a:prstGeom prst="straightConnector1">
+            <a:avLst/>
+          </a:prstGeom>
+          <a:ln>
+            <a:tailEnd type="arrow"/>
+          </a:ln>
+        </p:spPr>
+        <p:style>
+          <a:lnRef idx="1">
+            <a:schemeClr val="accent1"/>
+          </a:lnRef>
+          <a:fillRef idx="0">
+            <a:schemeClr val="accent1"/>
+          </a:fillRef>
+          <a:effectRef idx="0">
+            <a:schemeClr val="accent1"/>
+          </a:effectRef>
+          <a:fontRef idx="minor">
+            <a:schemeClr val="tx1"/>
+          </a:fontRef>
+        </p:style>
+      </p:cxnSp>
+      <p:sp>
+        <p:nvSpPr>
+          <p:cNvPr id="138" name="Oval 137"/>
+          <p:cNvSpPr/>
+          <p:nvPr/>
+        </p:nvSpPr>
+        <p:spPr>
+          <a:xfrm>
+            <a:off x="2421308" y="4446127"/>
+            <a:ext cx="245692" cy="278273"/>
+          </a:xfrm>
+          <a:prstGeom prst="ellipse">
+            <a:avLst/>
+          </a:prstGeom>
+        </p:spPr>
+        <p:style>
+          <a:lnRef idx="2">
+            <a:schemeClr val="accent1">
+              <a:shade val="50000"/>
+            </a:schemeClr>
+          </a:lnRef>
+          <a:fillRef idx="1">
+            <a:schemeClr val="accent1"/>
+          </a:fillRef>
+          <a:effectRef idx="0">
+            <a:schemeClr val="accent1"/>
+          </a:effectRef>
+          <a:fontRef idx="minor">
+            <a:schemeClr val="lt1"/>
+          </a:fontRef>
+        </p:style>
+        <p:txBody>
+          <a:bodyPr rtlCol="0" anchor="ctr"/>
+          <a:lstStyle/>
+          <a:p>
+            <a:pPr algn="ctr"/>
+            <a:r>
+              <a:rPr lang="en-US" dirty="0" smtClean="0"/>
+              <a:t>1</a:t>
+            </a:r>
+            <a:endParaRPr lang="en-US" dirty="0"/>
+          </a:p>
+        </p:txBody>
+      </p:sp>
+      <p:cxnSp>
+        <p:nvCxnSpPr>
+          <p:cNvPr id="31" name="Straight Arrow Connector 30"/>
+          <p:cNvCxnSpPr/>
+          <p:nvPr/>
+        </p:nvCxnSpPr>
+        <p:spPr>
+          <a:xfrm>
+            <a:off x="828730" y="533399"/>
+            <a:ext cx="9470" cy="304802"/>
+          </a:xfrm>
+          <a:prstGeom prst="straightConnector1">
+            <a:avLst/>
+          </a:prstGeom>
+          <a:ln>
+            <a:tailEnd type="arrow"/>
+          </a:ln>
+        </p:spPr>
+        <p:style>
+          <a:lnRef idx="1">
+            <a:schemeClr val="accent1"/>
+          </a:lnRef>
+          <a:fillRef idx="0">
+            <a:schemeClr val="accent1"/>
+          </a:fillRef>
+          <a:effectRef idx="0">
+            <a:schemeClr val="accent1"/>
+          </a:effectRef>
+          <a:fontRef idx="minor">
+            <a:schemeClr val="tx1"/>
+          </a:fontRef>
+        </p:style>
+      </p:cxnSp>
+      <p:cxnSp>
+        <p:nvCxnSpPr>
+          <p:cNvPr id="34" name="Elbow Connector 33"/>
+          <p:cNvCxnSpPr/>
+          <p:nvPr/>
+        </p:nvCxnSpPr>
+        <p:spPr>
+          <a:xfrm>
+            <a:off x="828730" y="533399"/>
+            <a:ext cx="3806426" cy="457201"/>
+          </a:xfrm>
+          <a:prstGeom prst="bentConnector3">
+            <a:avLst/>
+          </a:prstGeom>
+        </p:spPr>
+        <p:style>
+          <a:lnRef idx="1">
+            <a:schemeClr val="accent1"/>
+          </a:lnRef>
+          <a:fillRef idx="0">
+            <a:schemeClr val="accent1"/>
+          </a:fillRef>
+          <a:effectRef idx="0">
+            <a:schemeClr val="accent1"/>
+          </a:effectRef>
+          <a:fontRef idx="minor">
+            <a:schemeClr val="tx1"/>
+          </a:fontRef>
+        </p:style>
+      </p:cxnSp>
+      <p:cxnSp>
+        <p:nvCxnSpPr>
+          <p:cNvPr id="36" name="Straight Arrow Connector 35"/>
+          <p:cNvCxnSpPr>
+            <a:endCxn id="85" idx="2"/>
+          </p:cNvCxnSpPr>
+          <p:nvPr/>
+        </p:nvCxnSpPr>
+        <p:spPr>
+          <a:xfrm>
+            <a:off x="5871448" y="1104900"/>
+            <a:ext cx="1380596" cy="0"/>
+          </a:xfrm>
+          <a:prstGeom prst="straightConnector1">
+            <a:avLst/>
+          </a:prstGeom>
+          <a:ln>
+            <a:tailEnd type="arrow"/>
+          </a:ln>
+        </p:spPr>
+        <p:style>
+          <a:lnRef idx="1">
+            <a:schemeClr val="accent1"/>
+          </a:lnRef>
+          <a:fillRef idx="0">
+            <a:schemeClr val="accent1"/>
+          </a:fillRef>
+          <a:effectRef idx="0">
+            <a:schemeClr val="accent1"/>
+          </a:effectRef>
+          <a:fontRef idx="minor">
+            <a:schemeClr val="tx1"/>
+          </a:fontRef>
+        </p:style>
+      </p:cxnSp>
+      <p:cxnSp>
+        <p:nvCxnSpPr>
+          <p:cNvPr id="39" name="Straight Arrow Connector 38"/>
+          <p:cNvCxnSpPr>
+            <a:stCxn id="129" idx="3"/>
+            <a:endCxn id="96" idx="2"/>
+          </p:cNvCxnSpPr>
+          <p:nvPr/>
+        </p:nvCxnSpPr>
+        <p:spPr>
+          <a:xfrm>
+            <a:off x="5871448" y="4267200"/>
+            <a:ext cx="1384644" cy="0"/>
+          </a:xfrm>
+          <a:prstGeom prst="straightConnector1">
+            <a:avLst/>
+          </a:prstGeom>
+          <a:ln>
+            <a:tailEnd type="arrow"/>
+          </a:ln>
+        </p:spPr>
+        <p:style>
+          <a:lnRef idx="1">
+            <a:schemeClr val="accent1"/>
+          </a:lnRef>
+          <a:fillRef idx="0">
+            <a:schemeClr val="accent1"/>
+          </a:fillRef>
+          <a:effectRef idx="0">
+            <a:schemeClr val="accent1"/>
+          </a:effectRef>
+          <a:fontRef idx="minor">
+            <a:schemeClr val="tx1"/>
+          </a:fontRef>
+        </p:style>
+      </p:cxnSp>
+    </p:spTree>
+    <p:extLst>
+      <p:ext uri="{BB962C8B-B14F-4D97-AF65-F5344CB8AC3E}">
+        <p14:creationId xmlns:p14="http://schemas.microsoft.com/office/powerpoint/2010/main" val="3495121176"/>
+      </p:ext>
+    </p:extLst>
+  </p:cSld>
+  <p:clrMapOvr>
+    <a:masterClrMapping/>
+  </p:clrMapOvr>
+</p:sld>
+</file>
+
 <file path=ppt/theme/theme1.xml><?xml version="1.0" encoding="utf-8"?>
 <a:theme xmlns:a="http://schemas.openxmlformats.org/drawingml/2006/main" name="Office Theme">
   <a:themeElements>

</xml_diff>